<commit_message>
update the torch autograd blog
</commit_message>
<xml_diff>
--- a/绘图.pptx
+++ b/绘图.pptx
@@ -6,6 +6,7 @@
   </p:sldMasterIdLst>
   <p:sldIdLst>
     <p:sldId id="257" r:id="rId2"/>
+    <p:sldId id="258" r:id="rId3"/>
   </p:sldIdLst>
   <p:sldSz cx="12192000" cy="6858000"/>
   <p:notesSz cx="6858000" cy="9144000"/>
@@ -272,7 +273,7 @@
           <a:p>
             <a:fld id="{565645C6-4EA8-445D-A2B4-9E970A57CF6C}" type="datetimeFigureOut">
               <a:rPr lang="zh-CN" altLang="en-US" smtClean="0"/>
-              <a:t>2024/3/18</a:t>
+              <a:t>2024/4/15</a:t>
             </a:fld>
             <a:endParaRPr lang="zh-CN" altLang="en-US"/>
           </a:p>
@@ -472,7 +473,7 @@
           <a:p>
             <a:fld id="{565645C6-4EA8-445D-A2B4-9E970A57CF6C}" type="datetimeFigureOut">
               <a:rPr lang="zh-CN" altLang="en-US" smtClean="0"/>
-              <a:t>2024/3/18</a:t>
+              <a:t>2024/4/15</a:t>
             </a:fld>
             <a:endParaRPr lang="zh-CN" altLang="en-US"/>
           </a:p>
@@ -682,7 +683,7 @@
           <a:p>
             <a:fld id="{565645C6-4EA8-445D-A2B4-9E970A57CF6C}" type="datetimeFigureOut">
               <a:rPr lang="zh-CN" altLang="en-US" smtClean="0"/>
-              <a:t>2024/3/18</a:t>
+              <a:t>2024/4/15</a:t>
             </a:fld>
             <a:endParaRPr lang="zh-CN" altLang="en-US"/>
           </a:p>
@@ -882,7 +883,7 @@
           <a:p>
             <a:fld id="{565645C6-4EA8-445D-A2B4-9E970A57CF6C}" type="datetimeFigureOut">
               <a:rPr lang="zh-CN" altLang="en-US" smtClean="0"/>
-              <a:t>2024/3/18</a:t>
+              <a:t>2024/4/15</a:t>
             </a:fld>
             <a:endParaRPr lang="zh-CN" altLang="en-US"/>
           </a:p>
@@ -1158,7 +1159,7 @@
           <a:p>
             <a:fld id="{565645C6-4EA8-445D-A2B4-9E970A57CF6C}" type="datetimeFigureOut">
               <a:rPr lang="zh-CN" altLang="en-US" smtClean="0"/>
-              <a:t>2024/3/18</a:t>
+              <a:t>2024/4/15</a:t>
             </a:fld>
             <a:endParaRPr lang="zh-CN" altLang="en-US"/>
           </a:p>
@@ -1426,7 +1427,7 @@
           <a:p>
             <a:fld id="{565645C6-4EA8-445D-A2B4-9E970A57CF6C}" type="datetimeFigureOut">
               <a:rPr lang="zh-CN" altLang="en-US" smtClean="0"/>
-              <a:t>2024/3/18</a:t>
+              <a:t>2024/4/15</a:t>
             </a:fld>
             <a:endParaRPr lang="zh-CN" altLang="en-US"/>
           </a:p>
@@ -1841,7 +1842,7 @@
           <a:p>
             <a:fld id="{565645C6-4EA8-445D-A2B4-9E970A57CF6C}" type="datetimeFigureOut">
               <a:rPr lang="zh-CN" altLang="en-US" smtClean="0"/>
-              <a:t>2024/3/18</a:t>
+              <a:t>2024/4/15</a:t>
             </a:fld>
             <a:endParaRPr lang="zh-CN" altLang="en-US"/>
           </a:p>
@@ -1983,7 +1984,7 @@
           <a:p>
             <a:fld id="{565645C6-4EA8-445D-A2B4-9E970A57CF6C}" type="datetimeFigureOut">
               <a:rPr lang="zh-CN" altLang="en-US" smtClean="0"/>
-              <a:t>2024/3/18</a:t>
+              <a:t>2024/4/15</a:t>
             </a:fld>
             <a:endParaRPr lang="zh-CN" altLang="en-US"/>
           </a:p>
@@ -2096,7 +2097,7 @@
           <a:p>
             <a:fld id="{565645C6-4EA8-445D-A2B4-9E970A57CF6C}" type="datetimeFigureOut">
               <a:rPr lang="zh-CN" altLang="en-US" smtClean="0"/>
-              <a:t>2024/3/18</a:t>
+              <a:t>2024/4/15</a:t>
             </a:fld>
             <a:endParaRPr lang="zh-CN" altLang="en-US"/>
           </a:p>
@@ -2409,7 +2410,7 @@
           <a:p>
             <a:fld id="{565645C6-4EA8-445D-A2B4-9E970A57CF6C}" type="datetimeFigureOut">
               <a:rPr lang="zh-CN" altLang="en-US" smtClean="0"/>
-              <a:t>2024/3/18</a:t>
+              <a:t>2024/4/15</a:t>
             </a:fld>
             <a:endParaRPr lang="zh-CN" altLang="en-US"/>
           </a:p>
@@ -2698,7 +2699,7 @@
           <a:p>
             <a:fld id="{565645C6-4EA8-445D-A2B4-9E970A57CF6C}" type="datetimeFigureOut">
               <a:rPr lang="zh-CN" altLang="en-US" smtClean="0"/>
-              <a:t>2024/3/18</a:t>
+              <a:t>2024/4/15</a:t>
             </a:fld>
             <a:endParaRPr lang="zh-CN" altLang="en-US"/>
           </a:p>
@@ -2941,7 +2942,7 @@
           <a:p>
             <a:fld id="{565645C6-4EA8-445D-A2B4-9E970A57CF6C}" type="datetimeFigureOut">
               <a:rPr lang="zh-CN" altLang="en-US" smtClean="0"/>
-              <a:t>2024/3/18</a:t>
+              <a:t>2024/4/15</a:t>
             </a:fld>
             <a:endParaRPr lang="zh-CN" altLang="en-US"/>
           </a:p>
@@ -10050,6 +10051,3993 @@
 </p:sld>
 </file>
 
+<file path=ppt/slides/slide2.xml><?xml version="1.0" encoding="utf-8"?>
+<p:sld xmlns:a="http://schemas.openxmlformats.org/drawingml/2006/main" xmlns:r="http://schemas.openxmlformats.org/officeDocument/2006/relationships" xmlns:p="http://schemas.openxmlformats.org/presentationml/2006/main">
+  <p:cSld>
+    <p:spTree>
+      <p:nvGrpSpPr>
+        <p:cNvPr id="1" name=""/>
+        <p:cNvGrpSpPr/>
+        <p:nvPr/>
+      </p:nvGrpSpPr>
+      <p:grpSpPr>
+        <a:xfrm>
+          <a:off x="0" y="0"/>
+          <a:ext cx="0" cy="0"/>
+          <a:chOff x="0" y="0"/>
+          <a:chExt cx="0" cy="0"/>
+        </a:xfrm>
+      </p:grpSpPr>
+      <p:grpSp>
+        <p:nvGrpSpPr>
+          <p:cNvPr id="117" name="Group 116">
+            <a:extLst>
+              <a:ext uri="{FF2B5EF4-FFF2-40B4-BE49-F238E27FC236}">
+                <a16:creationId xmlns:a16="http://schemas.microsoft.com/office/drawing/2014/main" id="{95EC939B-FBE1-38FF-4D12-FC1BF715CE4F}"/>
+              </a:ext>
+            </a:extLst>
+          </p:cNvPr>
+          <p:cNvGrpSpPr/>
+          <p:nvPr/>
+        </p:nvGrpSpPr>
+        <p:grpSpPr>
+          <a:xfrm>
+            <a:off x="2901528" y="861822"/>
+            <a:ext cx="4600803" cy="2769897"/>
+            <a:chOff x="2895432" y="861822"/>
+            <a:chExt cx="4600803" cy="2769897"/>
+          </a:xfrm>
+        </p:grpSpPr>
+        <p:grpSp>
+          <p:nvGrpSpPr>
+            <p:cNvPr id="114" name="Group 113">
+              <a:extLst>
+                <a:ext uri="{FF2B5EF4-FFF2-40B4-BE49-F238E27FC236}">
+                  <a16:creationId xmlns:a16="http://schemas.microsoft.com/office/drawing/2014/main" id="{68E7C4D4-4648-31B5-0609-89F83B120EF3}"/>
+                </a:ext>
+              </a:extLst>
+            </p:cNvPr>
+            <p:cNvGrpSpPr/>
+            <p:nvPr/>
+          </p:nvGrpSpPr>
+          <p:grpSpPr>
+            <a:xfrm>
+              <a:off x="2895432" y="861822"/>
+              <a:ext cx="4590456" cy="2769897"/>
+              <a:chOff x="2895432" y="861822"/>
+              <a:chExt cx="4590456" cy="2769897"/>
+            </a:xfrm>
+          </p:grpSpPr>
+          <p:grpSp>
+            <p:nvGrpSpPr>
+              <p:cNvPr id="104" name="Group 103">
+                <a:extLst>
+                  <a:ext uri="{FF2B5EF4-FFF2-40B4-BE49-F238E27FC236}">
+                    <a16:creationId xmlns:a16="http://schemas.microsoft.com/office/drawing/2014/main" id="{1ED91400-6553-5C40-822B-F96BBB012D7A}"/>
+                  </a:ext>
+                </a:extLst>
+              </p:cNvPr>
+              <p:cNvGrpSpPr/>
+              <p:nvPr/>
+            </p:nvGrpSpPr>
+            <p:grpSpPr>
+              <a:xfrm>
+                <a:off x="2895432" y="861822"/>
+                <a:ext cx="4590456" cy="2769897"/>
+                <a:chOff x="5291160" y="1453134"/>
+                <a:chExt cx="4590456" cy="2769897"/>
+              </a:xfrm>
+            </p:grpSpPr>
+            <p:grpSp>
+              <p:nvGrpSpPr>
+                <p:cNvPr id="75" name="Group 74">
+                  <a:extLst>
+                    <a:ext uri="{FF2B5EF4-FFF2-40B4-BE49-F238E27FC236}">
+                      <a16:creationId xmlns:a16="http://schemas.microsoft.com/office/drawing/2014/main" id="{0889E51A-C254-B028-2EC7-BCA144AAB727}"/>
+                    </a:ext>
+                  </a:extLst>
+                </p:cNvPr>
+                <p:cNvGrpSpPr/>
+                <p:nvPr/>
+              </p:nvGrpSpPr>
+              <p:grpSpPr>
+                <a:xfrm>
+                  <a:off x="5291160" y="1453134"/>
+                  <a:ext cx="4590456" cy="2769897"/>
+                  <a:chOff x="5748360" y="1002030"/>
+                  <a:chExt cx="4590456" cy="2769897"/>
+                </a:xfrm>
+              </p:grpSpPr>
+              <p:cxnSp>
+                <p:nvCxnSpPr>
+                  <p:cNvPr id="14" name="Straight Arrow Connector 13">
+                    <a:extLst>
+                      <a:ext uri="{FF2B5EF4-FFF2-40B4-BE49-F238E27FC236}">
+                        <a16:creationId xmlns:a16="http://schemas.microsoft.com/office/drawing/2014/main" id="{708A552D-3DE7-CE4B-5730-3DC5DBFE4074}"/>
+                      </a:ext>
+                    </a:extLst>
+                  </p:cNvPr>
+                  <p:cNvCxnSpPr>
+                    <a:cxnSpLocks/>
+                  </p:cNvCxnSpPr>
+                  <p:nvPr/>
+                </p:nvCxnSpPr>
+                <p:spPr>
+                  <a:xfrm>
+                    <a:off x="6096000" y="3429000"/>
+                    <a:ext cx="4242816" cy="0"/>
+                  </a:xfrm>
+                  <a:prstGeom prst="straightConnector1">
+                    <a:avLst/>
+                  </a:prstGeom>
+                  <a:ln w="28575">
+                    <a:tailEnd type="triangle"/>
+                  </a:ln>
+                </p:spPr>
+                <p:style>
+                  <a:lnRef idx="1">
+                    <a:schemeClr val="dk1"/>
+                  </a:lnRef>
+                  <a:fillRef idx="0">
+                    <a:schemeClr val="dk1"/>
+                  </a:fillRef>
+                  <a:effectRef idx="0">
+                    <a:schemeClr val="dk1"/>
+                  </a:effectRef>
+                  <a:fontRef idx="minor">
+                    <a:schemeClr val="tx1"/>
+                  </a:fontRef>
+                </p:style>
+              </p:cxnSp>
+              <p:cxnSp>
+                <p:nvCxnSpPr>
+                  <p:cNvPr id="15" name="Straight Arrow Connector 14">
+                    <a:extLst>
+                      <a:ext uri="{FF2B5EF4-FFF2-40B4-BE49-F238E27FC236}">
+                        <a16:creationId xmlns:a16="http://schemas.microsoft.com/office/drawing/2014/main" id="{22102460-5F2D-E22E-80BD-799D7372F663}"/>
+                      </a:ext>
+                    </a:extLst>
+                  </p:cNvPr>
+                  <p:cNvCxnSpPr>
+                    <a:cxnSpLocks/>
+                  </p:cNvCxnSpPr>
+                  <p:nvPr/>
+                </p:nvCxnSpPr>
+                <p:spPr>
+                  <a:xfrm flipV="1">
+                    <a:off x="6096000" y="1002030"/>
+                    <a:ext cx="0" cy="2426970"/>
+                  </a:xfrm>
+                  <a:prstGeom prst="straightConnector1">
+                    <a:avLst/>
+                  </a:prstGeom>
+                  <a:ln w="28575">
+                    <a:tailEnd type="triangle"/>
+                  </a:ln>
+                </p:spPr>
+                <p:style>
+                  <a:lnRef idx="1">
+                    <a:schemeClr val="dk1"/>
+                  </a:lnRef>
+                  <a:fillRef idx="0">
+                    <a:schemeClr val="dk1"/>
+                  </a:fillRef>
+                  <a:effectRef idx="0">
+                    <a:schemeClr val="dk1"/>
+                  </a:effectRef>
+                  <a:fontRef idx="minor">
+                    <a:schemeClr val="tx1"/>
+                  </a:fontRef>
+                </p:style>
+              </p:cxnSp>
+              <p:grpSp>
+                <p:nvGrpSpPr>
+                  <p:cNvPr id="34" name="Group 33">
+                    <a:extLst>
+                      <a:ext uri="{FF2B5EF4-FFF2-40B4-BE49-F238E27FC236}">
+                        <a16:creationId xmlns:a16="http://schemas.microsoft.com/office/drawing/2014/main" id="{205A468A-4B26-A4BD-22A7-B42FC348620C}"/>
+                      </a:ext>
+                    </a:extLst>
+                  </p:cNvPr>
+                  <p:cNvGrpSpPr/>
+                  <p:nvPr/>
+                </p:nvGrpSpPr>
+                <p:grpSpPr>
+                  <a:xfrm>
+                    <a:off x="6091286" y="3429000"/>
+                    <a:ext cx="507510" cy="342927"/>
+                    <a:chOff x="6091286" y="3429000"/>
+                    <a:chExt cx="507510" cy="342927"/>
+                  </a:xfrm>
+                </p:grpSpPr>
+                <p:sp>
+                  <p:nvSpPr>
+                    <p:cNvPr id="17" name="Left Brace 16">
+                      <a:extLst>
+                        <a:ext uri="{FF2B5EF4-FFF2-40B4-BE49-F238E27FC236}">
+                          <a16:creationId xmlns:a16="http://schemas.microsoft.com/office/drawing/2014/main" id="{90D09F4B-AD66-FAF7-C73B-070883E74DC2}"/>
+                        </a:ext>
+                      </a:extLst>
+                    </p:cNvPr>
+                    <p:cNvSpPr/>
+                    <p:nvPr/>
+                  </p:nvSpPr>
+                  <p:spPr>
+                    <a:xfrm rot="16200000">
+                      <a:off x="6253354" y="3271646"/>
+                      <a:ext cx="142872" cy="457580"/>
+                    </a:xfrm>
+                    <a:prstGeom prst="leftBrace">
+                      <a:avLst/>
+                    </a:prstGeom>
+                    <a:ln w="19050">
+                      <a:solidFill>
+                        <a:srgbClr val="FF0000"/>
+                      </a:solidFill>
+                    </a:ln>
+                  </p:spPr>
+                  <p:style>
+                    <a:lnRef idx="1">
+                      <a:schemeClr val="dk1"/>
+                    </a:lnRef>
+                    <a:fillRef idx="0">
+                      <a:schemeClr val="dk1"/>
+                    </a:fillRef>
+                    <a:effectRef idx="0">
+                      <a:schemeClr val="dk1"/>
+                    </a:effectRef>
+                    <a:fontRef idx="minor">
+                      <a:schemeClr val="tx1"/>
+                    </a:fontRef>
+                  </p:style>
+                  <p:txBody>
+                    <a:bodyPr rtlCol="0" anchor="ctr"/>
+                    <a:lstStyle/>
+                    <a:p>
+                      <a:pPr algn="ctr"/>
+                      <a:endParaRPr lang="zh-CN" altLang="en-US"/>
+                    </a:p>
+                  </p:txBody>
+                </p:sp>
+                <mc:AlternateContent xmlns:mc="http://schemas.openxmlformats.org/markup-compatibility/2006">
+                  <mc:Choice xmlns:a14="http://schemas.microsoft.com/office/drawing/2010/main" Requires="a14">
+                    <p:sp>
+                      <p:nvSpPr>
+                        <p:cNvPr id="33" name="TextBox 32">
+                          <a:extLst>
+                            <a:ext uri="{FF2B5EF4-FFF2-40B4-BE49-F238E27FC236}">
+                              <a16:creationId xmlns:a16="http://schemas.microsoft.com/office/drawing/2014/main" id="{6F5088D6-B0E8-750E-256B-1304F6128B6E}"/>
+                            </a:ext>
+                          </a:extLst>
+                        </p:cNvPr>
+                        <p:cNvSpPr txBox="1"/>
+                        <p:nvPr/>
+                      </p:nvSpPr>
+                      <p:spPr>
+                        <a:xfrm>
+                          <a:off x="6091286" y="3571872"/>
+                          <a:ext cx="507510" cy="200055"/>
+                        </a:xfrm>
+                        <a:prstGeom prst="rect">
+                          <a:avLst/>
+                        </a:prstGeom>
+                        <a:noFill/>
+                      </p:spPr>
+                      <p:txBody>
+                        <a:bodyPr wrap="none" rtlCol="0">
+                          <a:spAutoFit/>
+                        </a:bodyPr>
+                        <a:lstStyle/>
+                        <a:p>
+                          <a14:m>
+                            <m:oMathPara xmlns:m="http://schemas.openxmlformats.org/officeDocument/2006/math">
+                              <m:oMathParaPr>
+                                <m:jc m:val="centerGroup"/>
+                              </m:oMathParaPr>
+                              <m:oMath xmlns:m="http://schemas.openxmlformats.org/officeDocument/2006/math">
+                                <m:sSub>
+                                  <m:sSubPr>
+                                    <m:ctrlPr>
+                                      <a:rPr lang="en-US" altLang="zh-CN" sz="700" i="1" smtClean="0">
+                                        <a:latin typeface="Cambria Math" panose="02040503050406030204" pitchFamily="18" charset="0"/>
+                                        <a:cs typeface="Times New Roman" panose="02020603050405020304" pitchFamily="18" charset="0"/>
+                                      </a:rPr>
+                                    </m:ctrlPr>
+                                  </m:sSubPr>
+                                  <m:e>
+                                    <m:r>
+                                      <a:rPr lang="en-US" altLang="zh-CN" sz="700" b="0" i="1" smtClean="0">
+                                        <a:latin typeface="Cambria Math" panose="02040503050406030204" pitchFamily="18" charset="0"/>
+                                        <a:cs typeface="Times New Roman" panose="02020603050405020304" pitchFamily="18" charset="0"/>
+                                      </a:rPr>
+                                      <m:t>𝑓𝑟𝑎𝑚𝑒</m:t>
+                                    </m:r>
+                                  </m:e>
+                                  <m:sub>
+                                    <m:r>
+                                      <a:rPr lang="en-US" altLang="zh-CN" sz="700" b="0" i="1" smtClean="0">
+                                        <a:latin typeface="Cambria Math" panose="02040503050406030204" pitchFamily="18" charset="0"/>
+                                        <a:cs typeface="Times New Roman" panose="02020603050405020304" pitchFamily="18" charset="0"/>
+                                      </a:rPr>
+                                      <m:t>1</m:t>
+                                    </m:r>
+                                  </m:sub>
+                                </m:sSub>
+                              </m:oMath>
+                            </m:oMathPara>
+                          </a14:m>
+                          <a:endParaRPr lang="zh-CN" altLang="en-US" sz="700" dirty="0">
+                            <a:latin typeface="Times New Roman" panose="02020603050405020304" pitchFamily="18" charset="0"/>
+                            <a:cs typeface="Times New Roman" panose="02020603050405020304" pitchFamily="18" charset="0"/>
+                          </a:endParaRPr>
+                        </a:p>
+                      </p:txBody>
+                    </p:sp>
+                  </mc:Choice>
+                  <mc:Fallback>
+                    <p:sp>
+                      <p:nvSpPr>
+                        <p:cNvPr id="33" name="TextBox 32">
+                          <a:extLst>
+                            <a:ext uri="{FF2B5EF4-FFF2-40B4-BE49-F238E27FC236}">
+                              <a16:creationId xmlns:a16="http://schemas.microsoft.com/office/drawing/2014/main" id="{6F5088D6-B0E8-750E-256B-1304F6128B6E}"/>
+                            </a:ext>
+                          </a:extLst>
+                        </p:cNvPr>
+                        <p:cNvSpPr txBox="1">
+                          <a:spLocks noRot="1" noChangeAspect="1" noMove="1" noResize="1" noEditPoints="1" noAdjustHandles="1" noChangeArrowheads="1" noChangeShapeType="1" noTextEdit="1"/>
+                        </p:cNvSpPr>
+                        <p:nvPr/>
+                      </p:nvSpPr>
+                      <p:spPr>
+                        <a:xfrm>
+                          <a:off x="6091286" y="3571872"/>
+                          <a:ext cx="507510" cy="200055"/>
+                        </a:xfrm>
+                        <a:prstGeom prst="rect">
+                          <a:avLst/>
+                        </a:prstGeom>
+                        <a:blipFill>
+                          <a:blip r:embed="rId2"/>
+                          <a:stretch>
+                            <a:fillRect/>
+                          </a:stretch>
+                        </a:blipFill>
+                      </p:spPr>
+                      <p:txBody>
+                        <a:bodyPr/>
+                        <a:lstStyle/>
+                        <a:p>
+                          <a:r>
+                            <a:rPr lang="zh-CN" altLang="en-US">
+                              <a:noFill/>
+                            </a:rPr>
+                            <a:t> </a:t>
+                          </a:r>
+                        </a:p>
+                      </p:txBody>
+                    </p:sp>
+                  </mc:Fallback>
+                </mc:AlternateContent>
+              </p:grpSp>
+              <p:grpSp>
+                <p:nvGrpSpPr>
+                  <p:cNvPr id="35" name="Group 34">
+                    <a:extLst>
+                      <a:ext uri="{FF2B5EF4-FFF2-40B4-BE49-F238E27FC236}">
+                        <a16:creationId xmlns:a16="http://schemas.microsoft.com/office/drawing/2014/main" id="{293688F4-09F6-A598-0200-29A05F4F47D9}"/>
+                      </a:ext>
+                    </a:extLst>
+                  </p:cNvPr>
+                  <p:cNvGrpSpPr/>
+                  <p:nvPr/>
+                </p:nvGrpSpPr>
+                <p:grpSpPr>
+                  <a:xfrm>
+                    <a:off x="6540179" y="3429000"/>
+                    <a:ext cx="509563" cy="342927"/>
+                    <a:chOff x="6091286" y="3429000"/>
+                    <a:chExt cx="509563" cy="342927"/>
+                  </a:xfrm>
+                </p:grpSpPr>
+                <p:sp>
+                  <p:nvSpPr>
+                    <p:cNvPr id="36" name="Left Brace 35">
+                      <a:extLst>
+                        <a:ext uri="{FF2B5EF4-FFF2-40B4-BE49-F238E27FC236}">
+                          <a16:creationId xmlns:a16="http://schemas.microsoft.com/office/drawing/2014/main" id="{BE7D56FF-4641-528C-C22A-4975414A9E82}"/>
+                        </a:ext>
+                      </a:extLst>
+                    </p:cNvPr>
+                    <p:cNvSpPr/>
+                    <p:nvPr/>
+                  </p:nvSpPr>
+                  <p:spPr>
+                    <a:xfrm rot="16200000">
+                      <a:off x="6253354" y="3271646"/>
+                      <a:ext cx="142872" cy="457580"/>
+                    </a:xfrm>
+                    <a:prstGeom prst="leftBrace">
+                      <a:avLst/>
+                    </a:prstGeom>
+                    <a:ln w="19050">
+                      <a:solidFill>
+                        <a:srgbClr val="FF0000"/>
+                      </a:solidFill>
+                    </a:ln>
+                  </p:spPr>
+                  <p:style>
+                    <a:lnRef idx="1">
+                      <a:schemeClr val="dk1"/>
+                    </a:lnRef>
+                    <a:fillRef idx="0">
+                      <a:schemeClr val="dk1"/>
+                    </a:fillRef>
+                    <a:effectRef idx="0">
+                      <a:schemeClr val="dk1"/>
+                    </a:effectRef>
+                    <a:fontRef idx="minor">
+                      <a:schemeClr val="tx1"/>
+                    </a:fontRef>
+                  </p:style>
+                  <p:txBody>
+                    <a:bodyPr rtlCol="0" anchor="ctr"/>
+                    <a:lstStyle/>
+                    <a:p>
+                      <a:pPr algn="ctr"/>
+                      <a:endParaRPr lang="zh-CN" altLang="en-US"/>
+                    </a:p>
+                  </p:txBody>
+                </p:sp>
+                <mc:AlternateContent xmlns:mc="http://schemas.openxmlformats.org/markup-compatibility/2006">
+                  <mc:Choice xmlns:a14="http://schemas.microsoft.com/office/drawing/2010/main" Requires="a14">
+                    <p:sp>
+                      <p:nvSpPr>
+                        <p:cNvPr id="37" name="TextBox 36">
+                          <a:extLst>
+                            <a:ext uri="{FF2B5EF4-FFF2-40B4-BE49-F238E27FC236}">
+                              <a16:creationId xmlns:a16="http://schemas.microsoft.com/office/drawing/2014/main" id="{C9BAA1CD-2500-BCA4-B310-01CE28A312DE}"/>
+                            </a:ext>
+                          </a:extLst>
+                        </p:cNvPr>
+                        <p:cNvSpPr txBox="1"/>
+                        <p:nvPr/>
+                      </p:nvSpPr>
+                      <p:spPr>
+                        <a:xfrm>
+                          <a:off x="6091286" y="3571872"/>
+                          <a:ext cx="509563" cy="200055"/>
+                        </a:xfrm>
+                        <a:prstGeom prst="rect">
+                          <a:avLst/>
+                        </a:prstGeom>
+                        <a:noFill/>
+                      </p:spPr>
+                      <p:txBody>
+                        <a:bodyPr wrap="none" rtlCol="0">
+                          <a:spAutoFit/>
+                        </a:bodyPr>
+                        <a:lstStyle/>
+                        <a:p>
+                          <a14:m>
+                            <m:oMathPara xmlns:m="http://schemas.openxmlformats.org/officeDocument/2006/math">
+                              <m:oMathParaPr>
+                                <m:jc m:val="centerGroup"/>
+                              </m:oMathParaPr>
+                              <m:oMath xmlns:m="http://schemas.openxmlformats.org/officeDocument/2006/math">
+                                <m:sSub>
+                                  <m:sSubPr>
+                                    <m:ctrlPr>
+                                      <a:rPr lang="en-US" altLang="zh-CN" sz="700" i="1" smtClean="0">
+                                        <a:latin typeface="Cambria Math" panose="02040503050406030204" pitchFamily="18" charset="0"/>
+                                        <a:cs typeface="Times New Roman" panose="02020603050405020304" pitchFamily="18" charset="0"/>
+                                      </a:rPr>
+                                    </m:ctrlPr>
+                                  </m:sSubPr>
+                                  <m:e>
+                                    <m:r>
+                                      <a:rPr lang="en-US" altLang="zh-CN" sz="700" b="0" i="1" smtClean="0">
+                                        <a:latin typeface="Cambria Math" panose="02040503050406030204" pitchFamily="18" charset="0"/>
+                                        <a:cs typeface="Times New Roman" panose="02020603050405020304" pitchFamily="18" charset="0"/>
+                                      </a:rPr>
+                                      <m:t>𝑓𝑟𝑎𝑚𝑒</m:t>
+                                    </m:r>
+                                  </m:e>
+                                  <m:sub>
+                                    <m:r>
+                                      <a:rPr lang="en-US" altLang="zh-CN" sz="700" b="0" i="1" smtClean="0">
+                                        <a:latin typeface="Cambria Math" panose="02040503050406030204" pitchFamily="18" charset="0"/>
+                                        <a:cs typeface="Times New Roman" panose="02020603050405020304" pitchFamily="18" charset="0"/>
+                                      </a:rPr>
+                                      <m:t>2</m:t>
+                                    </m:r>
+                                  </m:sub>
+                                </m:sSub>
+                              </m:oMath>
+                            </m:oMathPara>
+                          </a14:m>
+                          <a:endParaRPr lang="zh-CN" altLang="en-US" sz="700" dirty="0">
+                            <a:latin typeface="Times New Roman" panose="02020603050405020304" pitchFamily="18" charset="0"/>
+                            <a:cs typeface="Times New Roman" panose="02020603050405020304" pitchFamily="18" charset="0"/>
+                          </a:endParaRPr>
+                        </a:p>
+                      </p:txBody>
+                    </p:sp>
+                  </mc:Choice>
+                  <mc:Fallback>
+                    <p:sp>
+                      <p:nvSpPr>
+                        <p:cNvPr id="37" name="TextBox 36">
+                          <a:extLst>
+                            <a:ext uri="{FF2B5EF4-FFF2-40B4-BE49-F238E27FC236}">
+                              <a16:creationId xmlns:a16="http://schemas.microsoft.com/office/drawing/2014/main" id="{C9BAA1CD-2500-BCA4-B310-01CE28A312DE}"/>
+                            </a:ext>
+                          </a:extLst>
+                        </p:cNvPr>
+                        <p:cNvSpPr txBox="1">
+                          <a:spLocks noRot="1" noChangeAspect="1" noMove="1" noResize="1" noEditPoints="1" noAdjustHandles="1" noChangeArrowheads="1" noChangeShapeType="1" noTextEdit="1"/>
+                        </p:cNvSpPr>
+                        <p:nvPr/>
+                      </p:nvSpPr>
+                      <p:spPr>
+                        <a:xfrm>
+                          <a:off x="6091286" y="3571872"/>
+                          <a:ext cx="509563" cy="200055"/>
+                        </a:xfrm>
+                        <a:prstGeom prst="rect">
+                          <a:avLst/>
+                        </a:prstGeom>
+                        <a:blipFill>
+                          <a:blip r:embed="rId3"/>
+                          <a:stretch>
+                            <a:fillRect/>
+                          </a:stretch>
+                        </a:blipFill>
+                      </p:spPr>
+                      <p:txBody>
+                        <a:bodyPr/>
+                        <a:lstStyle/>
+                        <a:p>
+                          <a:r>
+                            <a:rPr lang="zh-CN" altLang="en-US">
+                              <a:noFill/>
+                            </a:rPr>
+                            <a:t> </a:t>
+                          </a:r>
+                        </a:p>
+                      </p:txBody>
+                    </p:sp>
+                  </mc:Fallback>
+                </mc:AlternateContent>
+              </p:grpSp>
+              <p:grpSp>
+                <p:nvGrpSpPr>
+                  <p:cNvPr id="38" name="Group 37">
+                    <a:extLst>
+                      <a:ext uri="{FF2B5EF4-FFF2-40B4-BE49-F238E27FC236}">
+                        <a16:creationId xmlns:a16="http://schemas.microsoft.com/office/drawing/2014/main" id="{3DF07E7A-D34B-E25F-B790-C00E5A7090DD}"/>
+                      </a:ext>
+                    </a:extLst>
+                  </p:cNvPr>
+                  <p:cNvGrpSpPr/>
+                  <p:nvPr/>
+                </p:nvGrpSpPr>
+                <p:grpSpPr>
+                  <a:xfrm>
+                    <a:off x="6989072" y="3429000"/>
+                    <a:ext cx="509563" cy="342927"/>
+                    <a:chOff x="6091286" y="3429000"/>
+                    <a:chExt cx="509563" cy="342927"/>
+                  </a:xfrm>
+                </p:grpSpPr>
+                <p:sp>
+                  <p:nvSpPr>
+                    <p:cNvPr id="39" name="Left Brace 38">
+                      <a:extLst>
+                        <a:ext uri="{FF2B5EF4-FFF2-40B4-BE49-F238E27FC236}">
+                          <a16:creationId xmlns:a16="http://schemas.microsoft.com/office/drawing/2014/main" id="{24B58280-25FE-CAA9-2737-7D109DAF7C88}"/>
+                        </a:ext>
+                      </a:extLst>
+                    </p:cNvPr>
+                    <p:cNvSpPr/>
+                    <p:nvPr/>
+                  </p:nvSpPr>
+                  <p:spPr>
+                    <a:xfrm rot="16200000">
+                      <a:off x="6253354" y="3271646"/>
+                      <a:ext cx="142872" cy="457580"/>
+                    </a:xfrm>
+                    <a:prstGeom prst="leftBrace">
+                      <a:avLst/>
+                    </a:prstGeom>
+                    <a:ln w="19050">
+                      <a:solidFill>
+                        <a:srgbClr val="FF0000"/>
+                      </a:solidFill>
+                    </a:ln>
+                  </p:spPr>
+                  <p:style>
+                    <a:lnRef idx="1">
+                      <a:schemeClr val="dk1"/>
+                    </a:lnRef>
+                    <a:fillRef idx="0">
+                      <a:schemeClr val="dk1"/>
+                    </a:fillRef>
+                    <a:effectRef idx="0">
+                      <a:schemeClr val="dk1"/>
+                    </a:effectRef>
+                    <a:fontRef idx="minor">
+                      <a:schemeClr val="tx1"/>
+                    </a:fontRef>
+                  </p:style>
+                  <p:txBody>
+                    <a:bodyPr rtlCol="0" anchor="ctr"/>
+                    <a:lstStyle/>
+                    <a:p>
+                      <a:pPr algn="ctr"/>
+                      <a:endParaRPr lang="zh-CN" altLang="en-US"/>
+                    </a:p>
+                  </p:txBody>
+                </p:sp>
+                <mc:AlternateContent xmlns:mc="http://schemas.openxmlformats.org/markup-compatibility/2006">
+                  <mc:Choice xmlns:a14="http://schemas.microsoft.com/office/drawing/2010/main" Requires="a14">
+                    <p:sp>
+                      <p:nvSpPr>
+                        <p:cNvPr id="40" name="TextBox 39">
+                          <a:extLst>
+                            <a:ext uri="{FF2B5EF4-FFF2-40B4-BE49-F238E27FC236}">
+                              <a16:creationId xmlns:a16="http://schemas.microsoft.com/office/drawing/2014/main" id="{76CA1D4C-3238-9877-123C-AEC30F5F19EC}"/>
+                            </a:ext>
+                          </a:extLst>
+                        </p:cNvPr>
+                        <p:cNvSpPr txBox="1"/>
+                        <p:nvPr/>
+                      </p:nvSpPr>
+                      <p:spPr>
+                        <a:xfrm>
+                          <a:off x="6091286" y="3571872"/>
+                          <a:ext cx="509563" cy="200055"/>
+                        </a:xfrm>
+                        <a:prstGeom prst="rect">
+                          <a:avLst/>
+                        </a:prstGeom>
+                        <a:noFill/>
+                      </p:spPr>
+                      <p:txBody>
+                        <a:bodyPr wrap="none" rtlCol="0">
+                          <a:spAutoFit/>
+                        </a:bodyPr>
+                        <a:lstStyle/>
+                        <a:p>
+                          <a14:m>
+                            <m:oMathPara xmlns:m="http://schemas.openxmlformats.org/officeDocument/2006/math">
+                              <m:oMathParaPr>
+                                <m:jc m:val="centerGroup"/>
+                              </m:oMathParaPr>
+                              <m:oMath xmlns:m="http://schemas.openxmlformats.org/officeDocument/2006/math">
+                                <m:sSub>
+                                  <m:sSubPr>
+                                    <m:ctrlPr>
+                                      <a:rPr lang="en-US" altLang="zh-CN" sz="700" i="1" smtClean="0">
+                                        <a:latin typeface="Cambria Math" panose="02040503050406030204" pitchFamily="18" charset="0"/>
+                                        <a:cs typeface="Times New Roman" panose="02020603050405020304" pitchFamily="18" charset="0"/>
+                                      </a:rPr>
+                                    </m:ctrlPr>
+                                  </m:sSubPr>
+                                  <m:e>
+                                    <m:r>
+                                      <a:rPr lang="en-US" altLang="zh-CN" sz="700" b="0" i="1" smtClean="0">
+                                        <a:latin typeface="Cambria Math" panose="02040503050406030204" pitchFamily="18" charset="0"/>
+                                        <a:cs typeface="Times New Roman" panose="02020603050405020304" pitchFamily="18" charset="0"/>
+                                      </a:rPr>
+                                      <m:t>𝑓𝑟𝑎𝑚𝑒</m:t>
+                                    </m:r>
+                                  </m:e>
+                                  <m:sub>
+                                    <m:r>
+                                      <a:rPr lang="en-US" altLang="zh-CN" sz="700" b="0" i="1" smtClean="0">
+                                        <a:latin typeface="Cambria Math" panose="02040503050406030204" pitchFamily="18" charset="0"/>
+                                        <a:cs typeface="Times New Roman" panose="02020603050405020304" pitchFamily="18" charset="0"/>
+                                      </a:rPr>
+                                      <m:t>3</m:t>
+                                    </m:r>
+                                  </m:sub>
+                                </m:sSub>
+                              </m:oMath>
+                            </m:oMathPara>
+                          </a14:m>
+                          <a:endParaRPr lang="zh-CN" altLang="en-US" sz="700" dirty="0">
+                            <a:latin typeface="Times New Roman" panose="02020603050405020304" pitchFamily="18" charset="0"/>
+                            <a:cs typeface="Times New Roman" panose="02020603050405020304" pitchFamily="18" charset="0"/>
+                          </a:endParaRPr>
+                        </a:p>
+                      </p:txBody>
+                    </p:sp>
+                  </mc:Choice>
+                  <mc:Fallback>
+                    <p:sp>
+                      <p:nvSpPr>
+                        <p:cNvPr id="40" name="TextBox 39">
+                          <a:extLst>
+                            <a:ext uri="{FF2B5EF4-FFF2-40B4-BE49-F238E27FC236}">
+                              <a16:creationId xmlns:a16="http://schemas.microsoft.com/office/drawing/2014/main" id="{76CA1D4C-3238-9877-123C-AEC30F5F19EC}"/>
+                            </a:ext>
+                          </a:extLst>
+                        </p:cNvPr>
+                        <p:cNvSpPr txBox="1">
+                          <a:spLocks noRot="1" noChangeAspect="1" noMove="1" noResize="1" noEditPoints="1" noAdjustHandles="1" noChangeArrowheads="1" noChangeShapeType="1" noTextEdit="1"/>
+                        </p:cNvSpPr>
+                        <p:nvPr/>
+                      </p:nvSpPr>
+                      <p:spPr>
+                        <a:xfrm>
+                          <a:off x="6091286" y="3571872"/>
+                          <a:ext cx="509563" cy="200055"/>
+                        </a:xfrm>
+                        <a:prstGeom prst="rect">
+                          <a:avLst/>
+                        </a:prstGeom>
+                        <a:blipFill>
+                          <a:blip r:embed="rId4"/>
+                          <a:stretch>
+                            <a:fillRect/>
+                          </a:stretch>
+                        </a:blipFill>
+                      </p:spPr>
+                      <p:txBody>
+                        <a:bodyPr/>
+                        <a:lstStyle/>
+                        <a:p>
+                          <a:r>
+                            <a:rPr lang="zh-CN" altLang="en-US">
+                              <a:noFill/>
+                            </a:rPr>
+                            <a:t> </a:t>
+                          </a:r>
+                        </a:p>
+                      </p:txBody>
+                    </p:sp>
+                  </mc:Fallback>
+                </mc:AlternateContent>
+              </p:grpSp>
+              <p:grpSp>
+                <p:nvGrpSpPr>
+                  <p:cNvPr id="41" name="Group 40">
+                    <a:extLst>
+                      <a:ext uri="{FF2B5EF4-FFF2-40B4-BE49-F238E27FC236}">
+                        <a16:creationId xmlns:a16="http://schemas.microsoft.com/office/drawing/2014/main" id="{5E0154B2-B2BF-F3F9-AF42-74E8331EB3C2}"/>
+                      </a:ext>
+                    </a:extLst>
+                  </p:cNvPr>
+                  <p:cNvGrpSpPr/>
+                  <p:nvPr/>
+                </p:nvGrpSpPr>
+                <p:grpSpPr>
+                  <a:xfrm>
+                    <a:off x="7437965" y="3429000"/>
+                    <a:ext cx="509563" cy="342927"/>
+                    <a:chOff x="6091286" y="3429000"/>
+                    <a:chExt cx="509563" cy="342927"/>
+                  </a:xfrm>
+                </p:grpSpPr>
+                <p:sp>
+                  <p:nvSpPr>
+                    <p:cNvPr id="42" name="Left Brace 41">
+                      <a:extLst>
+                        <a:ext uri="{FF2B5EF4-FFF2-40B4-BE49-F238E27FC236}">
+                          <a16:creationId xmlns:a16="http://schemas.microsoft.com/office/drawing/2014/main" id="{757A6DFD-8516-77BC-2A2C-0CB7AF4B6AE9}"/>
+                        </a:ext>
+                      </a:extLst>
+                    </p:cNvPr>
+                    <p:cNvSpPr/>
+                    <p:nvPr/>
+                  </p:nvSpPr>
+                  <p:spPr>
+                    <a:xfrm rot="16200000">
+                      <a:off x="6253354" y="3271646"/>
+                      <a:ext cx="142872" cy="457580"/>
+                    </a:xfrm>
+                    <a:prstGeom prst="leftBrace">
+                      <a:avLst/>
+                    </a:prstGeom>
+                    <a:ln w="19050">
+                      <a:solidFill>
+                        <a:srgbClr val="FF0000"/>
+                      </a:solidFill>
+                    </a:ln>
+                  </p:spPr>
+                  <p:style>
+                    <a:lnRef idx="1">
+                      <a:schemeClr val="dk1"/>
+                    </a:lnRef>
+                    <a:fillRef idx="0">
+                      <a:schemeClr val="dk1"/>
+                    </a:fillRef>
+                    <a:effectRef idx="0">
+                      <a:schemeClr val="dk1"/>
+                    </a:effectRef>
+                    <a:fontRef idx="minor">
+                      <a:schemeClr val="tx1"/>
+                    </a:fontRef>
+                  </p:style>
+                  <p:txBody>
+                    <a:bodyPr rtlCol="0" anchor="ctr"/>
+                    <a:lstStyle/>
+                    <a:p>
+                      <a:pPr algn="ctr"/>
+                      <a:endParaRPr lang="zh-CN" altLang="en-US"/>
+                    </a:p>
+                  </p:txBody>
+                </p:sp>
+                <mc:AlternateContent xmlns:mc="http://schemas.openxmlformats.org/markup-compatibility/2006">
+                  <mc:Choice xmlns:a14="http://schemas.microsoft.com/office/drawing/2010/main" Requires="a14">
+                    <p:sp>
+                      <p:nvSpPr>
+                        <p:cNvPr id="43" name="TextBox 42">
+                          <a:extLst>
+                            <a:ext uri="{FF2B5EF4-FFF2-40B4-BE49-F238E27FC236}">
+                              <a16:creationId xmlns:a16="http://schemas.microsoft.com/office/drawing/2014/main" id="{AC805BFE-3C02-FE20-6C0B-315AEEC48165}"/>
+                            </a:ext>
+                          </a:extLst>
+                        </p:cNvPr>
+                        <p:cNvSpPr txBox="1"/>
+                        <p:nvPr/>
+                      </p:nvSpPr>
+                      <p:spPr>
+                        <a:xfrm>
+                          <a:off x="6091286" y="3571872"/>
+                          <a:ext cx="509563" cy="200055"/>
+                        </a:xfrm>
+                        <a:prstGeom prst="rect">
+                          <a:avLst/>
+                        </a:prstGeom>
+                        <a:noFill/>
+                      </p:spPr>
+                      <p:txBody>
+                        <a:bodyPr wrap="none" rtlCol="0">
+                          <a:spAutoFit/>
+                        </a:bodyPr>
+                        <a:lstStyle/>
+                        <a:p>
+                          <a14:m>
+                            <m:oMathPara xmlns:m="http://schemas.openxmlformats.org/officeDocument/2006/math">
+                              <m:oMathParaPr>
+                                <m:jc m:val="centerGroup"/>
+                              </m:oMathParaPr>
+                              <m:oMath xmlns:m="http://schemas.openxmlformats.org/officeDocument/2006/math">
+                                <m:sSub>
+                                  <m:sSubPr>
+                                    <m:ctrlPr>
+                                      <a:rPr lang="en-US" altLang="zh-CN" sz="700" i="1" smtClean="0">
+                                        <a:latin typeface="Cambria Math" panose="02040503050406030204" pitchFamily="18" charset="0"/>
+                                        <a:cs typeface="Times New Roman" panose="02020603050405020304" pitchFamily="18" charset="0"/>
+                                      </a:rPr>
+                                    </m:ctrlPr>
+                                  </m:sSubPr>
+                                  <m:e>
+                                    <m:r>
+                                      <a:rPr lang="en-US" altLang="zh-CN" sz="700" b="0" i="1" smtClean="0">
+                                        <a:latin typeface="Cambria Math" panose="02040503050406030204" pitchFamily="18" charset="0"/>
+                                        <a:cs typeface="Times New Roman" panose="02020603050405020304" pitchFamily="18" charset="0"/>
+                                      </a:rPr>
+                                      <m:t>𝑓𝑟𝑎𝑚𝑒</m:t>
+                                    </m:r>
+                                  </m:e>
+                                  <m:sub>
+                                    <m:r>
+                                      <a:rPr lang="en-US" altLang="zh-CN" sz="700" b="0" i="1" smtClean="0">
+                                        <a:latin typeface="Cambria Math" panose="02040503050406030204" pitchFamily="18" charset="0"/>
+                                        <a:cs typeface="Times New Roman" panose="02020603050405020304" pitchFamily="18" charset="0"/>
+                                      </a:rPr>
+                                      <m:t>4</m:t>
+                                    </m:r>
+                                  </m:sub>
+                                </m:sSub>
+                              </m:oMath>
+                            </m:oMathPara>
+                          </a14:m>
+                          <a:endParaRPr lang="zh-CN" altLang="en-US" sz="700" dirty="0">
+                            <a:latin typeface="Times New Roman" panose="02020603050405020304" pitchFamily="18" charset="0"/>
+                            <a:cs typeface="Times New Roman" panose="02020603050405020304" pitchFamily="18" charset="0"/>
+                          </a:endParaRPr>
+                        </a:p>
+                      </p:txBody>
+                    </p:sp>
+                  </mc:Choice>
+                  <mc:Fallback>
+                    <p:sp>
+                      <p:nvSpPr>
+                        <p:cNvPr id="43" name="TextBox 42">
+                          <a:extLst>
+                            <a:ext uri="{FF2B5EF4-FFF2-40B4-BE49-F238E27FC236}">
+                              <a16:creationId xmlns:a16="http://schemas.microsoft.com/office/drawing/2014/main" id="{AC805BFE-3C02-FE20-6C0B-315AEEC48165}"/>
+                            </a:ext>
+                          </a:extLst>
+                        </p:cNvPr>
+                        <p:cNvSpPr txBox="1">
+                          <a:spLocks noRot="1" noChangeAspect="1" noMove="1" noResize="1" noEditPoints="1" noAdjustHandles="1" noChangeArrowheads="1" noChangeShapeType="1" noTextEdit="1"/>
+                        </p:cNvSpPr>
+                        <p:nvPr/>
+                      </p:nvSpPr>
+                      <p:spPr>
+                        <a:xfrm>
+                          <a:off x="6091286" y="3571872"/>
+                          <a:ext cx="509563" cy="200055"/>
+                        </a:xfrm>
+                        <a:prstGeom prst="rect">
+                          <a:avLst/>
+                        </a:prstGeom>
+                        <a:blipFill>
+                          <a:blip r:embed="rId5"/>
+                          <a:stretch>
+                            <a:fillRect/>
+                          </a:stretch>
+                        </a:blipFill>
+                      </p:spPr>
+                      <p:txBody>
+                        <a:bodyPr/>
+                        <a:lstStyle/>
+                        <a:p>
+                          <a:r>
+                            <a:rPr lang="zh-CN" altLang="en-US">
+                              <a:noFill/>
+                            </a:rPr>
+                            <a:t> </a:t>
+                          </a:r>
+                        </a:p>
+                      </p:txBody>
+                    </p:sp>
+                  </mc:Fallback>
+                </mc:AlternateContent>
+              </p:grpSp>
+              <p:grpSp>
+                <p:nvGrpSpPr>
+                  <p:cNvPr id="44" name="Group 43">
+                    <a:extLst>
+                      <a:ext uri="{FF2B5EF4-FFF2-40B4-BE49-F238E27FC236}">
+                        <a16:creationId xmlns:a16="http://schemas.microsoft.com/office/drawing/2014/main" id="{92DBC9E4-CBFB-BCF0-A721-E6D70E4DEA03}"/>
+                      </a:ext>
+                    </a:extLst>
+                  </p:cNvPr>
+                  <p:cNvGrpSpPr/>
+                  <p:nvPr/>
+                </p:nvGrpSpPr>
+                <p:grpSpPr>
+                  <a:xfrm>
+                    <a:off x="7886858" y="3429000"/>
+                    <a:ext cx="509563" cy="342927"/>
+                    <a:chOff x="6091286" y="3429000"/>
+                    <a:chExt cx="509563" cy="342927"/>
+                  </a:xfrm>
+                </p:grpSpPr>
+                <p:sp>
+                  <p:nvSpPr>
+                    <p:cNvPr id="45" name="Left Brace 44">
+                      <a:extLst>
+                        <a:ext uri="{FF2B5EF4-FFF2-40B4-BE49-F238E27FC236}">
+                          <a16:creationId xmlns:a16="http://schemas.microsoft.com/office/drawing/2014/main" id="{8D5BD33D-9C5A-877A-5446-D7E5B3A611AB}"/>
+                        </a:ext>
+                      </a:extLst>
+                    </p:cNvPr>
+                    <p:cNvSpPr/>
+                    <p:nvPr/>
+                  </p:nvSpPr>
+                  <p:spPr>
+                    <a:xfrm rot="16200000">
+                      <a:off x="6253354" y="3271646"/>
+                      <a:ext cx="142872" cy="457580"/>
+                    </a:xfrm>
+                    <a:prstGeom prst="leftBrace">
+                      <a:avLst/>
+                    </a:prstGeom>
+                    <a:ln w="19050">
+                      <a:solidFill>
+                        <a:srgbClr val="FF0000"/>
+                      </a:solidFill>
+                    </a:ln>
+                  </p:spPr>
+                  <p:style>
+                    <a:lnRef idx="1">
+                      <a:schemeClr val="dk1"/>
+                    </a:lnRef>
+                    <a:fillRef idx="0">
+                      <a:schemeClr val="dk1"/>
+                    </a:fillRef>
+                    <a:effectRef idx="0">
+                      <a:schemeClr val="dk1"/>
+                    </a:effectRef>
+                    <a:fontRef idx="minor">
+                      <a:schemeClr val="tx1"/>
+                    </a:fontRef>
+                  </p:style>
+                  <p:txBody>
+                    <a:bodyPr rtlCol="0" anchor="ctr"/>
+                    <a:lstStyle/>
+                    <a:p>
+                      <a:pPr algn="ctr"/>
+                      <a:endParaRPr lang="zh-CN" altLang="en-US"/>
+                    </a:p>
+                  </p:txBody>
+                </p:sp>
+                <mc:AlternateContent xmlns:mc="http://schemas.openxmlformats.org/markup-compatibility/2006">
+                  <mc:Choice xmlns:a14="http://schemas.microsoft.com/office/drawing/2010/main" Requires="a14">
+                    <p:sp>
+                      <p:nvSpPr>
+                        <p:cNvPr id="46" name="TextBox 45">
+                          <a:extLst>
+                            <a:ext uri="{FF2B5EF4-FFF2-40B4-BE49-F238E27FC236}">
+                              <a16:creationId xmlns:a16="http://schemas.microsoft.com/office/drawing/2014/main" id="{5FB914BD-A930-1A87-DD99-750092229BB1}"/>
+                            </a:ext>
+                          </a:extLst>
+                        </p:cNvPr>
+                        <p:cNvSpPr txBox="1"/>
+                        <p:nvPr/>
+                      </p:nvSpPr>
+                      <p:spPr>
+                        <a:xfrm>
+                          <a:off x="6091286" y="3571872"/>
+                          <a:ext cx="509563" cy="200055"/>
+                        </a:xfrm>
+                        <a:prstGeom prst="rect">
+                          <a:avLst/>
+                        </a:prstGeom>
+                        <a:noFill/>
+                      </p:spPr>
+                      <p:txBody>
+                        <a:bodyPr wrap="none" rtlCol="0">
+                          <a:spAutoFit/>
+                        </a:bodyPr>
+                        <a:lstStyle/>
+                        <a:p>
+                          <a14:m>
+                            <m:oMathPara xmlns:m="http://schemas.openxmlformats.org/officeDocument/2006/math">
+                              <m:oMathParaPr>
+                                <m:jc m:val="centerGroup"/>
+                              </m:oMathParaPr>
+                              <m:oMath xmlns:m="http://schemas.openxmlformats.org/officeDocument/2006/math">
+                                <m:sSub>
+                                  <m:sSubPr>
+                                    <m:ctrlPr>
+                                      <a:rPr lang="en-US" altLang="zh-CN" sz="700" i="1" smtClean="0">
+                                        <a:latin typeface="Cambria Math" panose="02040503050406030204" pitchFamily="18" charset="0"/>
+                                        <a:cs typeface="Times New Roman" panose="02020603050405020304" pitchFamily="18" charset="0"/>
+                                      </a:rPr>
+                                    </m:ctrlPr>
+                                  </m:sSubPr>
+                                  <m:e>
+                                    <m:r>
+                                      <a:rPr lang="en-US" altLang="zh-CN" sz="700" b="0" i="1" smtClean="0">
+                                        <a:latin typeface="Cambria Math" panose="02040503050406030204" pitchFamily="18" charset="0"/>
+                                        <a:cs typeface="Times New Roman" panose="02020603050405020304" pitchFamily="18" charset="0"/>
+                                      </a:rPr>
+                                      <m:t>𝑓𝑟𝑎𝑚𝑒</m:t>
+                                    </m:r>
+                                  </m:e>
+                                  <m:sub>
+                                    <m:r>
+                                      <a:rPr lang="en-US" altLang="zh-CN" sz="700" b="0" i="1" smtClean="0">
+                                        <a:latin typeface="Cambria Math" panose="02040503050406030204" pitchFamily="18" charset="0"/>
+                                        <a:cs typeface="Times New Roman" panose="02020603050405020304" pitchFamily="18" charset="0"/>
+                                      </a:rPr>
+                                      <m:t>5</m:t>
+                                    </m:r>
+                                  </m:sub>
+                                </m:sSub>
+                              </m:oMath>
+                            </m:oMathPara>
+                          </a14:m>
+                          <a:endParaRPr lang="zh-CN" altLang="en-US" sz="700" dirty="0">
+                            <a:latin typeface="Times New Roman" panose="02020603050405020304" pitchFamily="18" charset="0"/>
+                            <a:cs typeface="Times New Roman" panose="02020603050405020304" pitchFamily="18" charset="0"/>
+                          </a:endParaRPr>
+                        </a:p>
+                      </p:txBody>
+                    </p:sp>
+                  </mc:Choice>
+                  <mc:Fallback>
+                    <p:sp>
+                      <p:nvSpPr>
+                        <p:cNvPr id="46" name="TextBox 45">
+                          <a:extLst>
+                            <a:ext uri="{FF2B5EF4-FFF2-40B4-BE49-F238E27FC236}">
+                              <a16:creationId xmlns:a16="http://schemas.microsoft.com/office/drawing/2014/main" id="{5FB914BD-A930-1A87-DD99-750092229BB1}"/>
+                            </a:ext>
+                          </a:extLst>
+                        </p:cNvPr>
+                        <p:cNvSpPr txBox="1">
+                          <a:spLocks noRot="1" noChangeAspect="1" noMove="1" noResize="1" noEditPoints="1" noAdjustHandles="1" noChangeArrowheads="1" noChangeShapeType="1" noTextEdit="1"/>
+                        </p:cNvSpPr>
+                        <p:nvPr/>
+                      </p:nvSpPr>
+                      <p:spPr>
+                        <a:xfrm>
+                          <a:off x="6091286" y="3571872"/>
+                          <a:ext cx="509563" cy="200055"/>
+                        </a:xfrm>
+                        <a:prstGeom prst="rect">
+                          <a:avLst/>
+                        </a:prstGeom>
+                        <a:blipFill>
+                          <a:blip r:embed="rId6"/>
+                          <a:stretch>
+                            <a:fillRect/>
+                          </a:stretch>
+                        </a:blipFill>
+                      </p:spPr>
+                      <p:txBody>
+                        <a:bodyPr/>
+                        <a:lstStyle/>
+                        <a:p>
+                          <a:r>
+                            <a:rPr lang="zh-CN" altLang="en-US">
+                              <a:noFill/>
+                            </a:rPr>
+                            <a:t> </a:t>
+                          </a:r>
+                        </a:p>
+                      </p:txBody>
+                    </p:sp>
+                  </mc:Fallback>
+                </mc:AlternateContent>
+              </p:grpSp>
+              <p:grpSp>
+                <p:nvGrpSpPr>
+                  <p:cNvPr id="47" name="Group 46">
+                    <a:extLst>
+                      <a:ext uri="{FF2B5EF4-FFF2-40B4-BE49-F238E27FC236}">
+                        <a16:creationId xmlns:a16="http://schemas.microsoft.com/office/drawing/2014/main" id="{CD901EAB-6265-C4C2-A38A-35A1291142A9}"/>
+                      </a:ext>
+                    </a:extLst>
+                  </p:cNvPr>
+                  <p:cNvGrpSpPr/>
+                  <p:nvPr/>
+                </p:nvGrpSpPr>
+                <p:grpSpPr>
+                  <a:xfrm>
+                    <a:off x="8335751" y="3429000"/>
+                    <a:ext cx="509563" cy="342927"/>
+                    <a:chOff x="6091286" y="3429000"/>
+                    <a:chExt cx="509563" cy="342927"/>
+                  </a:xfrm>
+                </p:grpSpPr>
+                <p:sp>
+                  <p:nvSpPr>
+                    <p:cNvPr id="48" name="Left Brace 47">
+                      <a:extLst>
+                        <a:ext uri="{FF2B5EF4-FFF2-40B4-BE49-F238E27FC236}">
+                          <a16:creationId xmlns:a16="http://schemas.microsoft.com/office/drawing/2014/main" id="{EB15C627-EF19-91F0-BDC2-156C6FAF8465}"/>
+                        </a:ext>
+                      </a:extLst>
+                    </p:cNvPr>
+                    <p:cNvSpPr/>
+                    <p:nvPr/>
+                  </p:nvSpPr>
+                  <p:spPr>
+                    <a:xfrm rot="16200000">
+                      <a:off x="6253354" y="3271646"/>
+                      <a:ext cx="142872" cy="457580"/>
+                    </a:xfrm>
+                    <a:prstGeom prst="leftBrace">
+                      <a:avLst/>
+                    </a:prstGeom>
+                    <a:ln w="19050">
+                      <a:solidFill>
+                        <a:srgbClr val="FF0000"/>
+                      </a:solidFill>
+                    </a:ln>
+                  </p:spPr>
+                  <p:style>
+                    <a:lnRef idx="1">
+                      <a:schemeClr val="dk1"/>
+                    </a:lnRef>
+                    <a:fillRef idx="0">
+                      <a:schemeClr val="dk1"/>
+                    </a:fillRef>
+                    <a:effectRef idx="0">
+                      <a:schemeClr val="dk1"/>
+                    </a:effectRef>
+                    <a:fontRef idx="minor">
+                      <a:schemeClr val="tx1"/>
+                    </a:fontRef>
+                  </p:style>
+                  <p:txBody>
+                    <a:bodyPr rtlCol="0" anchor="ctr"/>
+                    <a:lstStyle/>
+                    <a:p>
+                      <a:pPr algn="ctr"/>
+                      <a:endParaRPr lang="zh-CN" altLang="en-US"/>
+                    </a:p>
+                  </p:txBody>
+                </p:sp>
+                <mc:AlternateContent xmlns:mc="http://schemas.openxmlformats.org/markup-compatibility/2006">
+                  <mc:Choice xmlns:a14="http://schemas.microsoft.com/office/drawing/2010/main" Requires="a14">
+                    <p:sp>
+                      <p:nvSpPr>
+                        <p:cNvPr id="49" name="TextBox 48">
+                          <a:extLst>
+                            <a:ext uri="{FF2B5EF4-FFF2-40B4-BE49-F238E27FC236}">
+                              <a16:creationId xmlns:a16="http://schemas.microsoft.com/office/drawing/2014/main" id="{52B07CB5-3480-DEF1-AF4A-0D8FF31AC361}"/>
+                            </a:ext>
+                          </a:extLst>
+                        </p:cNvPr>
+                        <p:cNvSpPr txBox="1"/>
+                        <p:nvPr/>
+                      </p:nvSpPr>
+                      <p:spPr>
+                        <a:xfrm>
+                          <a:off x="6091286" y="3571872"/>
+                          <a:ext cx="509563" cy="200055"/>
+                        </a:xfrm>
+                        <a:prstGeom prst="rect">
+                          <a:avLst/>
+                        </a:prstGeom>
+                        <a:noFill/>
+                      </p:spPr>
+                      <p:txBody>
+                        <a:bodyPr wrap="none" rtlCol="0">
+                          <a:spAutoFit/>
+                        </a:bodyPr>
+                        <a:lstStyle/>
+                        <a:p>
+                          <a14:m>
+                            <m:oMathPara xmlns:m="http://schemas.openxmlformats.org/officeDocument/2006/math">
+                              <m:oMathParaPr>
+                                <m:jc m:val="centerGroup"/>
+                              </m:oMathParaPr>
+                              <m:oMath xmlns:m="http://schemas.openxmlformats.org/officeDocument/2006/math">
+                                <m:sSub>
+                                  <m:sSubPr>
+                                    <m:ctrlPr>
+                                      <a:rPr lang="en-US" altLang="zh-CN" sz="700" i="1" smtClean="0">
+                                        <a:latin typeface="Cambria Math" panose="02040503050406030204" pitchFamily="18" charset="0"/>
+                                        <a:cs typeface="Times New Roman" panose="02020603050405020304" pitchFamily="18" charset="0"/>
+                                      </a:rPr>
+                                    </m:ctrlPr>
+                                  </m:sSubPr>
+                                  <m:e>
+                                    <m:r>
+                                      <a:rPr lang="en-US" altLang="zh-CN" sz="700" b="0" i="1" smtClean="0">
+                                        <a:latin typeface="Cambria Math" panose="02040503050406030204" pitchFamily="18" charset="0"/>
+                                        <a:cs typeface="Times New Roman" panose="02020603050405020304" pitchFamily="18" charset="0"/>
+                                      </a:rPr>
+                                      <m:t>𝑓𝑟𝑎𝑚𝑒</m:t>
+                                    </m:r>
+                                  </m:e>
+                                  <m:sub>
+                                    <m:r>
+                                      <a:rPr lang="en-US" altLang="zh-CN" sz="700" b="0" i="1" smtClean="0">
+                                        <a:latin typeface="Cambria Math" panose="02040503050406030204" pitchFamily="18" charset="0"/>
+                                        <a:cs typeface="Times New Roman" panose="02020603050405020304" pitchFamily="18" charset="0"/>
+                                      </a:rPr>
+                                      <m:t>6</m:t>
+                                    </m:r>
+                                  </m:sub>
+                                </m:sSub>
+                              </m:oMath>
+                            </m:oMathPara>
+                          </a14:m>
+                          <a:endParaRPr lang="zh-CN" altLang="en-US" sz="700" dirty="0">
+                            <a:latin typeface="Times New Roman" panose="02020603050405020304" pitchFamily="18" charset="0"/>
+                            <a:cs typeface="Times New Roman" panose="02020603050405020304" pitchFamily="18" charset="0"/>
+                          </a:endParaRPr>
+                        </a:p>
+                      </p:txBody>
+                    </p:sp>
+                  </mc:Choice>
+                  <mc:Fallback>
+                    <p:sp>
+                      <p:nvSpPr>
+                        <p:cNvPr id="49" name="TextBox 48">
+                          <a:extLst>
+                            <a:ext uri="{FF2B5EF4-FFF2-40B4-BE49-F238E27FC236}">
+                              <a16:creationId xmlns:a16="http://schemas.microsoft.com/office/drawing/2014/main" id="{52B07CB5-3480-DEF1-AF4A-0D8FF31AC361}"/>
+                            </a:ext>
+                          </a:extLst>
+                        </p:cNvPr>
+                        <p:cNvSpPr txBox="1">
+                          <a:spLocks noRot="1" noChangeAspect="1" noMove="1" noResize="1" noEditPoints="1" noAdjustHandles="1" noChangeArrowheads="1" noChangeShapeType="1" noTextEdit="1"/>
+                        </p:cNvSpPr>
+                        <p:nvPr/>
+                      </p:nvSpPr>
+                      <p:spPr>
+                        <a:xfrm>
+                          <a:off x="6091286" y="3571872"/>
+                          <a:ext cx="509563" cy="200055"/>
+                        </a:xfrm>
+                        <a:prstGeom prst="rect">
+                          <a:avLst/>
+                        </a:prstGeom>
+                        <a:blipFill>
+                          <a:blip r:embed="rId7"/>
+                          <a:stretch>
+                            <a:fillRect/>
+                          </a:stretch>
+                        </a:blipFill>
+                      </p:spPr>
+                      <p:txBody>
+                        <a:bodyPr/>
+                        <a:lstStyle/>
+                        <a:p>
+                          <a:r>
+                            <a:rPr lang="zh-CN" altLang="en-US">
+                              <a:noFill/>
+                            </a:rPr>
+                            <a:t> </a:t>
+                          </a:r>
+                        </a:p>
+                      </p:txBody>
+                    </p:sp>
+                  </mc:Fallback>
+                </mc:AlternateContent>
+              </p:grpSp>
+              <p:grpSp>
+                <p:nvGrpSpPr>
+                  <p:cNvPr id="50" name="Group 49">
+                    <a:extLst>
+                      <a:ext uri="{FF2B5EF4-FFF2-40B4-BE49-F238E27FC236}">
+                        <a16:creationId xmlns:a16="http://schemas.microsoft.com/office/drawing/2014/main" id="{B4C4B5F0-3E3F-3799-64EE-6CC291B4B0D5}"/>
+                      </a:ext>
+                    </a:extLst>
+                  </p:cNvPr>
+                  <p:cNvGrpSpPr/>
+                  <p:nvPr/>
+                </p:nvGrpSpPr>
+                <p:grpSpPr>
+                  <a:xfrm>
+                    <a:off x="8784644" y="3429000"/>
+                    <a:ext cx="509563" cy="342927"/>
+                    <a:chOff x="6091286" y="3429000"/>
+                    <a:chExt cx="509563" cy="342927"/>
+                  </a:xfrm>
+                </p:grpSpPr>
+                <p:sp>
+                  <p:nvSpPr>
+                    <p:cNvPr id="51" name="Left Brace 50">
+                      <a:extLst>
+                        <a:ext uri="{FF2B5EF4-FFF2-40B4-BE49-F238E27FC236}">
+                          <a16:creationId xmlns:a16="http://schemas.microsoft.com/office/drawing/2014/main" id="{9107CFDD-16BE-A155-27AA-9A5E87DB84EB}"/>
+                        </a:ext>
+                      </a:extLst>
+                    </p:cNvPr>
+                    <p:cNvSpPr/>
+                    <p:nvPr/>
+                  </p:nvSpPr>
+                  <p:spPr>
+                    <a:xfrm rot="16200000">
+                      <a:off x="6253354" y="3271646"/>
+                      <a:ext cx="142872" cy="457580"/>
+                    </a:xfrm>
+                    <a:prstGeom prst="leftBrace">
+                      <a:avLst/>
+                    </a:prstGeom>
+                    <a:ln w="19050">
+                      <a:solidFill>
+                        <a:srgbClr val="FF0000"/>
+                      </a:solidFill>
+                    </a:ln>
+                  </p:spPr>
+                  <p:style>
+                    <a:lnRef idx="1">
+                      <a:schemeClr val="dk1"/>
+                    </a:lnRef>
+                    <a:fillRef idx="0">
+                      <a:schemeClr val="dk1"/>
+                    </a:fillRef>
+                    <a:effectRef idx="0">
+                      <a:schemeClr val="dk1"/>
+                    </a:effectRef>
+                    <a:fontRef idx="minor">
+                      <a:schemeClr val="tx1"/>
+                    </a:fontRef>
+                  </p:style>
+                  <p:txBody>
+                    <a:bodyPr rtlCol="0" anchor="ctr"/>
+                    <a:lstStyle/>
+                    <a:p>
+                      <a:pPr algn="ctr"/>
+                      <a:endParaRPr lang="zh-CN" altLang="en-US"/>
+                    </a:p>
+                  </p:txBody>
+                </p:sp>
+                <mc:AlternateContent xmlns:mc="http://schemas.openxmlformats.org/markup-compatibility/2006">
+                  <mc:Choice xmlns:a14="http://schemas.microsoft.com/office/drawing/2010/main" Requires="a14">
+                    <p:sp>
+                      <p:nvSpPr>
+                        <p:cNvPr id="52" name="TextBox 51">
+                          <a:extLst>
+                            <a:ext uri="{FF2B5EF4-FFF2-40B4-BE49-F238E27FC236}">
+                              <a16:creationId xmlns:a16="http://schemas.microsoft.com/office/drawing/2014/main" id="{53F7B6B8-754E-9035-D222-696B5004FDBC}"/>
+                            </a:ext>
+                          </a:extLst>
+                        </p:cNvPr>
+                        <p:cNvSpPr txBox="1"/>
+                        <p:nvPr/>
+                      </p:nvSpPr>
+                      <p:spPr>
+                        <a:xfrm>
+                          <a:off x="6091286" y="3571872"/>
+                          <a:ext cx="509563" cy="200055"/>
+                        </a:xfrm>
+                        <a:prstGeom prst="rect">
+                          <a:avLst/>
+                        </a:prstGeom>
+                        <a:noFill/>
+                      </p:spPr>
+                      <p:txBody>
+                        <a:bodyPr wrap="none" rtlCol="0">
+                          <a:spAutoFit/>
+                        </a:bodyPr>
+                        <a:lstStyle/>
+                        <a:p>
+                          <a14:m>
+                            <m:oMathPara xmlns:m="http://schemas.openxmlformats.org/officeDocument/2006/math">
+                              <m:oMathParaPr>
+                                <m:jc m:val="centerGroup"/>
+                              </m:oMathParaPr>
+                              <m:oMath xmlns:m="http://schemas.openxmlformats.org/officeDocument/2006/math">
+                                <m:sSub>
+                                  <m:sSubPr>
+                                    <m:ctrlPr>
+                                      <a:rPr lang="en-US" altLang="zh-CN" sz="700" i="1" smtClean="0">
+                                        <a:latin typeface="Cambria Math" panose="02040503050406030204" pitchFamily="18" charset="0"/>
+                                        <a:cs typeface="Times New Roman" panose="02020603050405020304" pitchFamily="18" charset="0"/>
+                                      </a:rPr>
+                                    </m:ctrlPr>
+                                  </m:sSubPr>
+                                  <m:e>
+                                    <m:r>
+                                      <a:rPr lang="en-US" altLang="zh-CN" sz="700" b="0" i="1" smtClean="0">
+                                        <a:latin typeface="Cambria Math" panose="02040503050406030204" pitchFamily="18" charset="0"/>
+                                        <a:cs typeface="Times New Roman" panose="02020603050405020304" pitchFamily="18" charset="0"/>
+                                      </a:rPr>
+                                      <m:t>𝑓𝑟𝑎𝑚𝑒</m:t>
+                                    </m:r>
+                                  </m:e>
+                                  <m:sub>
+                                    <m:r>
+                                      <a:rPr lang="en-US" altLang="zh-CN" sz="700" b="0" i="1" smtClean="0">
+                                        <a:latin typeface="Cambria Math" panose="02040503050406030204" pitchFamily="18" charset="0"/>
+                                        <a:cs typeface="Times New Roman" panose="02020603050405020304" pitchFamily="18" charset="0"/>
+                                      </a:rPr>
+                                      <m:t>7</m:t>
+                                    </m:r>
+                                  </m:sub>
+                                </m:sSub>
+                              </m:oMath>
+                            </m:oMathPara>
+                          </a14:m>
+                          <a:endParaRPr lang="zh-CN" altLang="en-US" sz="700" dirty="0">
+                            <a:latin typeface="Times New Roman" panose="02020603050405020304" pitchFamily="18" charset="0"/>
+                            <a:cs typeface="Times New Roman" panose="02020603050405020304" pitchFamily="18" charset="0"/>
+                          </a:endParaRPr>
+                        </a:p>
+                      </p:txBody>
+                    </p:sp>
+                  </mc:Choice>
+                  <mc:Fallback>
+                    <p:sp>
+                      <p:nvSpPr>
+                        <p:cNvPr id="52" name="TextBox 51">
+                          <a:extLst>
+                            <a:ext uri="{FF2B5EF4-FFF2-40B4-BE49-F238E27FC236}">
+                              <a16:creationId xmlns:a16="http://schemas.microsoft.com/office/drawing/2014/main" id="{53F7B6B8-754E-9035-D222-696B5004FDBC}"/>
+                            </a:ext>
+                          </a:extLst>
+                        </p:cNvPr>
+                        <p:cNvSpPr txBox="1">
+                          <a:spLocks noRot="1" noChangeAspect="1" noMove="1" noResize="1" noEditPoints="1" noAdjustHandles="1" noChangeArrowheads="1" noChangeShapeType="1" noTextEdit="1"/>
+                        </p:cNvSpPr>
+                        <p:nvPr/>
+                      </p:nvSpPr>
+                      <p:spPr>
+                        <a:xfrm>
+                          <a:off x="6091286" y="3571872"/>
+                          <a:ext cx="509563" cy="200055"/>
+                        </a:xfrm>
+                        <a:prstGeom prst="rect">
+                          <a:avLst/>
+                        </a:prstGeom>
+                        <a:blipFill>
+                          <a:blip r:embed="rId8"/>
+                          <a:stretch>
+                            <a:fillRect/>
+                          </a:stretch>
+                        </a:blipFill>
+                      </p:spPr>
+                      <p:txBody>
+                        <a:bodyPr/>
+                        <a:lstStyle/>
+                        <a:p>
+                          <a:r>
+                            <a:rPr lang="zh-CN" altLang="en-US">
+                              <a:noFill/>
+                            </a:rPr>
+                            <a:t> </a:t>
+                          </a:r>
+                        </a:p>
+                      </p:txBody>
+                    </p:sp>
+                  </mc:Fallback>
+                </mc:AlternateContent>
+              </p:grpSp>
+              <p:grpSp>
+                <p:nvGrpSpPr>
+                  <p:cNvPr id="53" name="Group 52">
+                    <a:extLst>
+                      <a:ext uri="{FF2B5EF4-FFF2-40B4-BE49-F238E27FC236}">
+                        <a16:creationId xmlns:a16="http://schemas.microsoft.com/office/drawing/2014/main" id="{8A347271-4CA7-656A-7894-764B9B65AE65}"/>
+                      </a:ext>
+                    </a:extLst>
+                  </p:cNvPr>
+                  <p:cNvGrpSpPr/>
+                  <p:nvPr/>
+                </p:nvGrpSpPr>
+                <p:grpSpPr>
+                  <a:xfrm>
+                    <a:off x="9233537" y="3429000"/>
+                    <a:ext cx="509563" cy="342927"/>
+                    <a:chOff x="6091286" y="3429000"/>
+                    <a:chExt cx="509563" cy="342927"/>
+                  </a:xfrm>
+                </p:grpSpPr>
+                <p:sp>
+                  <p:nvSpPr>
+                    <p:cNvPr id="54" name="Left Brace 53">
+                      <a:extLst>
+                        <a:ext uri="{FF2B5EF4-FFF2-40B4-BE49-F238E27FC236}">
+                          <a16:creationId xmlns:a16="http://schemas.microsoft.com/office/drawing/2014/main" id="{4F75CE90-C747-FA00-13D0-4A6073F0E8B3}"/>
+                        </a:ext>
+                      </a:extLst>
+                    </p:cNvPr>
+                    <p:cNvSpPr/>
+                    <p:nvPr/>
+                  </p:nvSpPr>
+                  <p:spPr>
+                    <a:xfrm rot="16200000">
+                      <a:off x="6253354" y="3271646"/>
+                      <a:ext cx="142872" cy="457580"/>
+                    </a:xfrm>
+                    <a:prstGeom prst="leftBrace">
+                      <a:avLst/>
+                    </a:prstGeom>
+                    <a:ln w="19050">
+                      <a:solidFill>
+                        <a:srgbClr val="FF0000"/>
+                      </a:solidFill>
+                    </a:ln>
+                  </p:spPr>
+                  <p:style>
+                    <a:lnRef idx="1">
+                      <a:schemeClr val="dk1"/>
+                    </a:lnRef>
+                    <a:fillRef idx="0">
+                      <a:schemeClr val="dk1"/>
+                    </a:fillRef>
+                    <a:effectRef idx="0">
+                      <a:schemeClr val="dk1"/>
+                    </a:effectRef>
+                    <a:fontRef idx="minor">
+                      <a:schemeClr val="tx1"/>
+                    </a:fontRef>
+                  </p:style>
+                  <p:txBody>
+                    <a:bodyPr rtlCol="0" anchor="ctr"/>
+                    <a:lstStyle/>
+                    <a:p>
+                      <a:pPr algn="ctr"/>
+                      <a:endParaRPr lang="zh-CN" altLang="en-US"/>
+                    </a:p>
+                  </p:txBody>
+                </p:sp>
+                <mc:AlternateContent xmlns:mc="http://schemas.openxmlformats.org/markup-compatibility/2006">
+                  <mc:Choice xmlns:a14="http://schemas.microsoft.com/office/drawing/2010/main" Requires="a14">
+                    <p:sp>
+                      <p:nvSpPr>
+                        <p:cNvPr id="55" name="TextBox 54">
+                          <a:extLst>
+                            <a:ext uri="{FF2B5EF4-FFF2-40B4-BE49-F238E27FC236}">
+                              <a16:creationId xmlns:a16="http://schemas.microsoft.com/office/drawing/2014/main" id="{C6C1E034-739F-7854-A6BF-3390DDD1764D}"/>
+                            </a:ext>
+                          </a:extLst>
+                        </p:cNvPr>
+                        <p:cNvSpPr txBox="1"/>
+                        <p:nvPr/>
+                      </p:nvSpPr>
+                      <p:spPr>
+                        <a:xfrm>
+                          <a:off x="6091286" y="3571872"/>
+                          <a:ext cx="509563" cy="200055"/>
+                        </a:xfrm>
+                        <a:prstGeom prst="rect">
+                          <a:avLst/>
+                        </a:prstGeom>
+                        <a:noFill/>
+                      </p:spPr>
+                      <p:txBody>
+                        <a:bodyPr wrap="none" rtlCol="0">
+                          <a:spAutoFit/>
+                        </a:bodyPr>
+                        <a:lstStyle/>
+                        <a:p>
+                          <a14:m>
+                            <m:oMathPara xmlns:m="http://schemas.openxmlformats.org/officeDocument/2006/math">
+                              <m:oMathParaPr>
+                                <m:jc m:val="centerGroup"/>
+                              </m:oMathParaPr>
+                              <m:oMath xmlns:m="http://schemas.openxmlformats.org/officeDocument/2006/math">
+                                <m:sSub>
+                                  <m:sSubPr>
+                                    <m:ctrlPr>
+                                      <a:rPr lang="en-US" altLang="zh-CN" sz="700" i="1" smtClean="0">
+                                        <a:latin typeface="Cambria Math" panose="02040503050406030204" pitchFamily="18" charset="0"/>
+                                        <a:cs typeface="Times New Roman" panose="02020603050405020304" pitchFamily="18" charset="0"/>
+                                      </a:rPr>
+                                    </m:ctrlPr>
+                                  </m:sSubPr>
+                                  <m:e>
+                                    <m:r>
+                                      <a:rPr lang="en-US" altLang="zh-CN" sz="700" b="0" i="1" smtClean="0">
+                                        <a:latin typeface="Cambria Math" panose="02040503050406030204" pitchFamily="18" charset="0"/>
+                                        <a:cs typeface="Times New Roman" panose="02020603050405020304" pitchFamily="18" charset="0"/>
+                                      </a:rPr>
+                                      <m:t>𝑓𝑟𝑎𝑚𝑒</m:t>
+                                    </m:r>
+                                  </m:e>
+                                  <m:sub>
+                                    <m:r>
+                                      <a:rPr lang="en-US" altLang="zh-CN" sz="700" b="0" i="1" smtClean="0">
+                                        <a:latin typeface="Cambria Math" panose="02040503050406030204" pitchFamily="18" charset="0"/>
+                                        <a:cs typeface="Times New Roman" panose="02020603050405020304" pitchFamily="18" charset="0"/>
+                                      </a:rPr>
+                                      <m:t>8</m:t>
+                                    </m:r>
+                                  </m:sub>
+                                </m:sSub>
+                              </m:oMath>
+                            </m:oMathPara>
+                          </a14:m>
+                          <a:endParaRPr lang="zh-CN" altLang="en-US" sz="700" dirty="0">
+                            <a:latin typeface="Times New Roman" panose="02020603050405020304" pitchFamily="18" charset="0"/>
+                            <a:cs typeface="Times New Roman" panose="02020603050405020304" pitchFamily="18" charset="0"/>
+                          </a:endParaRPr>
+                        </a:p>
+                      </p:txBody>
+                    </p:sp>
+                  </mc:Choice>
+                  <mc:Fallback>
+                    <p:sp>
+                      <p:nvSpPr>
+                        <p:cNvPr id="55" name="TextBox 54">
+                          <a:extLst>
+                            <a:ext uri="{FF2B5EF4-FFF2-40B4-BE49-F238E27FC236}">
+                              <a16:creationId xmlns:a16="http://schemas.microsoft.com/office/drawing/2014/main" id="{C6C1E034-739F-7854-A6BF-3390DDD1764D}"/>
+                            </a:ext>
+                          </a:extLst>
+                        </p:cNvPr>
+                        <p:cNvSpPr txBox="1">
+                          <a:spLocks noRot="1" noChangeAspect="1" noMove="1" noResize="1" noEditPoints="1" noAdjustHandles="1" noChangeArrowheads="1" noChangeShapeType="1" noTextEdit="1"/>
+                        </p:cNvSpPr>
+                        <p:nvPr/>
+                      </p:nvSpPr>
+                      <p:spPr>
+                        <a:xfrm>
+                          <a:off x="6091286" y="3571872"/>
+                          <a:ext cx="509563" cy="200055"/>
+                        </a:xfrm>
+                        <a:prstGeom prst="rect">
+                          <a:avLst/>
+                        </a:prstGeom>
+                        <a:blipFill>
+                          <a:blip r:embed="rId9"/>
+                          <a:stretch>
+                            <a:fillRect/>
+                          </a:stretch>
+                        </a:blipFill>
+                      </p:spPr>
+                      <p:txBody>
+                        <a:bodyPr/>
+                        <a:lstStyle/>
+                        <a:p>
+                          <a:r>
+                            <a:rPr lang="zh-CN" altLang="en-US">
+                              <a:noFill/>
+                            </a:rPr>
+                            <a:t> </a:t>
+                          </a:r>
+                        </a:p>
+                      </p:txBody>
+                    </p:sp>
+                  </mc:Fallback>
+                </mc:AlternateContent>
+              </p:grpSp>
+              <p:grpSp>
+                <p:nvGrpSpPr>
+                  <p:cNvPr id="56" name="Group 55">
+                    <a:extLst>
+                      <a:ext uri="{FF2B5EF4-FFF2-40B4-BE49-F238E27FC236}">
+                        <a16:creationId xmlns:a16="http://schemas.microsoft.com/office/drawing/2014/main" id="{B42614F7-3BCD-D1F3-369F-AE838485E4E3}"/>
+                      </a:ext>
+                    </a:extLst>
+                  </p:cNvPr>
+                  <p:cNvGrpSpPr/>
+                  <p:nvPr/>
+                </p:nvGrpSpPr>
+                <p:grpSpPr>
+                  <a:xfrm>
+                    <a:off x="9682430" y="3429000"/>
+                    <a:ext cx="507960" cy="342927"/>
+                    <a:chOff x="6091286" y="3429000"/>
+                    <a:chExt cx="507960" cy="342927"/>
+                  </a:xfrm>
+                </p:grpSpPr>
+                <p:sp>
+                  <p:nvSpPr>
+                    <p:cNvPr id="57" name="Left Brace 56">
+                      <a:extLst>
+                        <a:ext uri="{FF2B5EF4-FFF2-40B4-BE49-F238E27FC236}">
+                          <a16:creationId xmlns:a16="http://schemas.microsoft.com/office/drawing/2014/main" id="{0E551177-C31E-E9BD-CBB3-9B40B25CA318}"/>
+                        </a:ext>
+                      </a:extLst>
+                    </p:cNvPr>
+                    <p:cNvSpPr/>
+                    <p:nvPr/>
+                  </p:nvSpPr>
+                  <p:spPr>
+                    <a:xfrm rot="16200000">
+                      <a:off x="6253354" y="3271646"/>
+                      <a:ext cx="142872" cy="457580"/>
+                    </a:xfrm>
+                    <a:prstGeom prst="leftBrace">
+                      <a:avLst/>
+                    </a:prstGeom>
+                    <a:ln w="19050">
+                      <a:solidFill>
+                        <a:srgbClr val="FF0000"/>
+                      </a:solidFill>
+                    </a:ln>
+                  </p:spPr>
+                  <p:style>
+                    <a:lnRef idx="1">
+                      <a:schemeClr val="dk1"/>
+                    </a:lnRef>
+                    <a:fillRef idx="0">
+                      <a:schemeClr val="dk1"/>
+                    </a:fillRef>
+                    <a:effectRef idx="0">
+                      <a:schemeClr val="dk1"/>
+                    </a:effectRef>
+                    <a:fontRef idx="minor">
+                      <a:schemeClr val="tx1"/>
+                    </a:fontRef>
+                  </p:style>
+                  <p:txBody>
+                    <a:bodyPr rtlCol="0" anchor="ctr"/>
+                    <a:lstStyle/>
+                    <a:p>
+                      <a:pPr algn="ctr"/>
+                      <a:endParaRPr lang="zh-CN" altLang="en-US"/>
+                    </a:p>
+                  </p:txBody>
+                </p:sp>
+                <mc:AlternateContent xmlns:mc="http://schemas.openxmlformats.org/markup-compatibility/2006">
+                  <mc:Choice xmlns:a14="http://schemas.microsoft.com/office/drawing/2010/main" Requires="a14">
+                    <p:sp>
+                      <p:nvSpPr>
+                        <p:cNvPr id="58" name="TextBox 57">
+                          <a:extLst>
+                            <a:ext uri="{FF2B5EF4-FFF2-40B4-BE49-F238E27FC236}">
+                              <a16:creationId xmlns:a16="http://schemas.microsoft.com/office/drawing/2014/main" id="{8D3DEE7A-9433-4C7F-61DE-C097E17901BD}"/>
+                            </a:ext>
+                          </a:extLst>
+                        </p:cNvPr>
+                        <p:cNvSpPr txBox="1"/>
+                        <p:nvPr/>
+                      </p:nvSpPr>
+                      <p:spPr>
+                        <a:xfrm>
+                          <a:off x="6091286" y="3571872"/>
+                          <a:ext cx="507960" cy="200055"/>
+                        </a:xfrm>
+                        <a:prstGeom prst="rect">
+                          <a:avLst/>
+                        </a:prstGeom>
+                        <a:noFill/>
+                      </p:spPr>
+                      <p:txBody>
+                        <a:bodyPr wrap="none" rtlCol="0">
+                          <a:spAutoFit/>
+                        </a:bodyPr>
+                        <a:lstStyle/>
+                        <a:p>
+                          <a14:m>
+                            <m:oMathPara xmlns:m="http://schemas.openxmlformats.org/officeDocument/2006/math">
+                              <m:oMathParaPr>
+                                <m:jc m:val="centerGroup"/>
+                              </m:oMathParaPr>
+                              <m:oMath xmlns:m="http://schemas.openxmlformats.org/officeDocument/2006/math">
+                                <m:sSub>
+                                  <m:sSubPr>
+                                    <m:ctrlPr>
+                                      <a:rPr lang="en-US" altLang="zh-CN" sz="700" i="1" smtClean="0">
+                                        <a:latin typeface="Cambria Math" panose="02040503050406030204" pitchFamily="18" charset="0"/>
+                                        <a:cs typeface="Times New Roman" panose="02020603050405020304" pitchFamily="18" charset="0"/>
+                                      </a:rPr>
+                                    </m:ctrlPr>
+                                  </m:sSubPr>
+                                  <m:e>
+                                    <m:r>
+                                      <a:rPr lang="en-US" altLang="zh-CN" sz="700" b="0" i="1" smtClean="0">
+                                        <a:latin typeface="Cambria Math" panose="02040503050406030204" pitchFamily="18" charset="0"/>
+                                        <a:cs typeface="Times New Roman" panose="02020603050405020304" pitchFamily="18" charset="0"/>
+                                      </a:rPr>
+                                      <m:t>𝑓𝑟𝑎𝑚𝑒</m:t>
+                                    </m:r>
+                                  </m:e>
+                                  <m:sub>
+                                    <m:r>
+                                      <a:rPr lang="en-US" altLang="zh-CN" sz="700" b="0" i="1" smtClean="0">
+                                        <a:latin typeface="Cambria Math" panose="02040503050406030204" pitchFamily="18" charset="0"/>
+                                        <a:cs typeface="Times New Roman" panose="02020603050405020304" pitchFamily="18" charset="0"/>
+                                      </a:rPr>
+                                      <m:t>9</m:t>
+                                    </m:r>
+                                  </m:sub>
+                                </m:sSub>
+                              </m:oMath>
+                            </m:oMathPara>
+                          </a14:m>
+                          <a:endParaRPr lang="zh-CN" altLang="en-US" sz="700" dirty="0">
+                            <a:latin typeface="Times New Roman" panose="02020603050405020304" pitchFamily="18" charset="0"/>
+                            <a:cs typeface="Times New Roman" panose="02020603050405020304" pitchFamily="18" charset="0"/>
+                          </a:endParaRPr>
+                        </a:p>
+                      </p:txBody>
+                    </p:sp>
+                  </mc:Choice>
+                  <mc:Fallback>
+                    <p:sp>
+                      <p:nvSpPr>
+                        <p:cNvPr id="58" name="TextBox 57">
+                          <a:extLst>
+                            <a:ext uri="{FF2B5EF4-FFF2-40B4-BE49-F238E27FC236}">
+                              <a16:creationId xmlns:a16="http://schemas.microsoft.com/office/drawing/2014/main" id="{8D3DEE7A-9433-4C7F-61DE-C097E17901BD}"/>
+                            </a:ext>
+                          </a:extLst>
+                        </p:cNvPr>
+                        <p:cNvSpPr txBox="1">
+                          <a:spLocks noRot="1" noChangeAspect="1" noMove="1" noResize="1" noEditPoints="1" noAdjustHandles="1" noChangeArrowheads="1" noChangeShapeType="1" noTextEdit="1"/>
+                        </p:cNvSpPr>
+                        <p:nvPr/>
+                      </p:nvSpPr>
+                      <p:spPr>
+                        <a:xfrm>
+                          <a:off x="6091286" y="3571872"/>
+                          <a:ext cx="507960" cy="200055"/>
+                        </a:xfrm>
+                        <a:prstGeom prst="rect">
+                          <a:avLst/>
+                        </a:prstGeom>
+                        <a:blipFill>
+                          <a:blip r:embed="rId10"/>
+                          <a:stretch>
+                            <a:fillRect/>
+                          </a:stretch>
+                        </a:blipFill>
+                      </p:spPr>
+                      <p:txBody>
+                        <a:bodyPr/>
+                        <a:lstStyle/>
+                        <a:p>
+                          <a:r>
+                            <a:rPr lang="zh-CN" altLang="en-US">
+                              <a:noFill/>
+                            </a:rPr>
+                            <a:t> </a:t>
+                          </a:r>
+                        </a:p>
+                      </p:txBody>
+                    </p:sp>
+                  </mc:Fallback>
+                </mc:AlternateContent>
+              </p:grpSp>
+              <p:grpSp>
+                <p:nvGrpSpPr>
+                  <p:cNvPr id="60" name="Group 59">
+                    <a:extLst>
+                      <a:ext uri="{FF2B5EF4-FFF2-40B4-BE49-F238E27FC236}">
+                        <a16:creationId xmlns:a16="http://schemas.microsoft.com/office/drawing/2014/main" id="{32935F68-FF1C-CC2E-5A2D-CB01FF476D5E}"/>
+                      </a:ext>
+                    </a:extLst>
+                  </p:cNvPr>
+                  <p:cNvGrpSpPr/>
+                  <p:nvPr/>
+                </p:nvGrpSpPr>
+                <p:grpSpPr>
+                  <a:xfrm rot="5400000">
+                    <a:off x="5680333" y="3047933"/>
+                    <a:ext cx="478982" cy="342927"/>
+                    <a:chOff x="6096000" y="3429000"/>
+                    <a:chExt cx="478982" cy="342927"/>
+                  </a:xfrm>
+                </p:grpSpPr>
+                <p:sp>
+                  <p:nvSpPr>
+                    <p:cNvPr id="61" name="Left Brace 60">
+                      <a:extLst>
+                        <a:ext uri="{FF2B5EF4-FFF2-40B4-BE49-F238E27FC236}">
+                          <a16:creationId xmlns:a16="http://schemas.microsoft.com/office/drawing/2014/main" id="{984C7185-CAF5-132C-6660-9B367A508FBA}"/>
+                        </a:ext>
+                      </a:extLst>
+                    </p:cNvPr>
+                    <p:cNvSpPr/>
+                    <p:nvPr/>
+                  </p:nvSpPr>
+                  <p:spPr>
+                    <a:xfrm rot="16200000">
+                      <a:off x="6253354" y="3271646"/>
+                      <a:ext cx="142872" cy="457580"/>
+                    </a:xfrm>
+                    <a:prstGeom prst="leftBrace">
+                      <a:avLst/>
+                    </a:prstGeom>
+                    <a:ln w="19050">
+                      <a:solidFill>
+                        <a:srgbClr val="00B050"/>
+                      </a:solidFill>
+                    </a:ln>
+                  </p:spPr>
+                  <p:style>
+                    <a:lnRef idx="1">
+                      <a:schemeClr val="dk1"/>
+                    </a:lnRef>
+                    <a:fillRef idx="0">
+                      <a:schemeClr val="dk1"/>
+                    </a:fillRef>
+                    <a:effectRef idx="0">
+                      <a:schemeClr val="dk1"/>
+                    </a:effectRef>
+                    <a:fontRef idx="minor">
+                      <a:schemeClr val="tx1"/>
+                    </a:fontRef>
+                  </p:style>
+                  <p:txBody>
+                    <a:bodyPr rtlCol="0" anchor="ctr"/>
+                    <a:lstStyle/>
+                    <a:p>
+                      <a:pPr algn="ctr"/>
+                      <a:endParaRPr lang="zh-CN" altLang="en-US"/>
+                    </a:p>
+                  </p:txBody>
+                </p:sp>
+                <mc:AlternateContent xmlns:mc="http://schemas.openxmlformats.org/markup-compatibility/2006">
+                  <mc:Choice xmlns:a14="http://schemas.microsoft.com/office/drawing/2010/main" Requires="a14">
+                    <p:sp>
+                      <p:nvSpPr>
+                        <p:cNvPr id="62" name="TextBox 61">
+                          <a:extLst>
+                            <a:ext uri="{FF2B5EF4-FFF2-40B4-BE49-F238E27FC236}">
+                              <a16:creationId xmlns:a16="http://schemas.microsoft.com/office/drawing/2014/main" id="{4949F2BB-7537-A6EA-A930-0A168063DF8C}"/>
+                            </a:ext>
+                          </a:extLst>
+                        </p:cNvPr>
+                        <p:cNvSpPr txBox="1"/>
+                        <p:nvPr/>
+                      </p:nvSpPr>
+                      <p:spPr>
+                        <a:xfrm>
+                          <a:off x="6115113" y="3571872"/>
+                          <a:ext cx="459869" cy="200055"/>
+                        </a:xfrm>
+                        <a:prstGeom prst="rect">
+                          <a:avLst/>
+                        </a:prstGeom>
+                        <a:noFill/>
+                      </p:spPr>
+                      <p:txBody>
+                        <a:bodyPr wrap="none" rtlCol="0">
+                          <a:spAutoFit/>
+                        </a:bodyPr>
+                        <a:lstStyle/>
+                        <a:p>
+                          <a14:m>
+                            <m:oMathPara xmlns:m="http://schemas.openxmlformats.org/officeDocument/2006/math">
+                              <m:oMathParaPr>
+                                <m:jc m:val="centerGroup"/>
+                              </m:oMathParaPr>
+                              <m:oMath xmlns:m="http://schemas.openxmlformats.org/officeDocument/2006/math">
+                                <m:sSub>
+                                  <m:sSubPr>
+                                    <m:ctrlPr>
+                                      <a:rPr lang="en-US" altLang="zh-CN" sz="700" i="1" smtClean="0">
+                                        <a:latin typeface="Cambria Math" panose="02040503050406030204" pitchFamily="18" charset="0"/>
+                                        <a:cs typeface="Times New Roman" panose="02020603050405020304" pitchFamily="18" charset="0"/>
+                                      </a:rPr>
+                                    </m:ctrlPr>
+                                  </m:sSubPr>
+                                  <m:e>
+                                    <m:r>
+                                      <a:rPr lang="en-US" altLang="zh-CN" sz="700" b="0" i="1" smtClean="0">
+                                        <a:latin typeface="Cambria Math" panose="02040503050406030204" pitchFamily="18" charset="0"/>
+                                        <a:cs typeface="Times New Roman" panose="02020603050405020304" pitchFamily="18" charset="0"/>
+                                      </a:rPr>
+                                      <m:t>𝑔𝑙𝑜𝑠𝑠</m:t>
+                                    </m:r>
+                                  </m:e>
+                                  <m:sub>
+                                    <m:r>
+                                      <a:rPr lang="en-US" altLang="zh-CN" sz="700" b="0" i="1" smtClean="0">
+                                        <a:latin typeface="Cambria Math" panose="02040503050406030204" pitchFamily="18" charset="0"/>
+                                        <a:cs typeface="Times New Roman" panose="02020603050405020304" pitchFamily="18" charset="0"/>
+                                      </a:rPr>
+                                      <m:t>1</m:t>
+                                    </m:r>
+                                  </m:sub>
+                                </m:sSub>
+                              </m:oMath>
+                            </m:oMathPara>
+                          </a14:m>
+                          <a:endParaRPr lang="zh-CN" altLang="en-US" sz="700" dirty="0">
+                            <a:latin typeface="Times New Roman" panose="02020603050405020304" pitchFamily="18" charset="0"/>
+                            <a:cs typeface="Times New Roman" panose="02020603050405020304" pitchFamily="18" charset="0"/>
+                          </a:endParaRPr>
+                        </a:p>
+                      </p:txBody>
+                    </p:sp>
+                  </mc:Choice>
+                  <mc:Fallback>
+                    <p:sp>
+                      <p:nvSpPr>
+                        <p:cNvPr id="62" name="TextBox 61">
+                          <a:extLst>
+                            <a:ext uri="{FF2B5EF4-FFF2-40B4-BE49-F238E27FC236}">
+                              <a16:creationId xmlns:a16="http://schemas.microsoft.com/office/drawing/2014/main" id="{4949F2BB-7537-A6EA-A930-0A168063DF8C}"/>
+                            </a:ext>
+                          </a:extLst>
+                        </p:cNvPr>
+                        <p:cNvSpPr txBox="1">
+                          <a:spLocks noRot="1" noChangeAspect="1" noMove="1" noResize="1" noEditPoints="1" noAdjustHandles="1" noChangeArrowheads="1" noChangeShapeType="1" noTextEdit="1"/>
+                        </p:cNvSpPr>
+                        <p:nvPr/>
+                      </p:nvSpPr>
+                      <p:spPr>
+                        <a:xfrm>
+                          <a:off x="6115113" y="3571872"/>
+                          <a:ext cx="459869" cy="200055"/>
+                        </a:xfrm>
+                        <a:prstGeom prst="rect">
+                          <a:avLst/>
+                        </a:prstGeom>
+                        <a:blipFill>
+                          <a:blip r:embed="rId11"/>
+                          <a:stretch>
+                            <a:fillRect/>
+                          </a:stretch>
+                        </a:blipFill>
+                      </p:spPr>
+                      <p:txBody>
+                        <a:bodyPr/>
+                        <a:lstStyle/>
+                        <a:p>
+                          <a:r>
+                            <a:rPr lang="zh-CN" altLang="en-US">
+                              <a:noFill/>
+                            </a:rPr>
+                            <a:t> </a:t>
+                          </a:r>
+                        </a:p>
+                      </p:txBody>
+                    </p:sp>
+                  </mc:Fallback>
+                </mc:AlternateContent>
+              </p:grpSp>
+              <p:grpSp>
+                <p:nvGrpSpPr>
+                  <p:cNvPr id="63" name="Group 62">
+                    <a:extLst>
+                      <a:ext uri="{FF2B5EF4-FFF2-40B4-BE49-F238E27FC236}">
+                        <a16:creationId xmlns:a16="http://schemas.microsoft.com/office/drawing/2014/main" id="{3CC5C101-51C8-BFF0-58D3-9DB8932EF6B5}"/>
+                      </a:ext>
+                    </a:extLst>
+                  </p:cNvPr>
+                  <p:cNvGrpSpPr/>
+                  <p:nvPr/>
+                </p:nvGrpSpPr>
+                <p:grpSpPr>
+                  <a:xfrm rot="5400000">
+                    <a:off x="5679819" y="2588579"/>
+                    <a:ext cx="480010" cy="342927"/>
+                    <a:chOff x="6096000" y="3429000"/>
+                    <a:chExt cx="480010" cy="342927"/>
+                  </a:xfrm>
+                </p:grpSpPr>
+                <p:sp>
+                  <p:nvSpPr>
+                    <p:cNvPr id="64" name="Left Brace 63">
+                      <a:extLst>
+                        <a:ext uri="{FF2B5EF4-FFF2-40B4-BE49-F238E27FC236}">
+                          <a16:creationId xmlns:a16="http://schemas.microsoft.com/office/drawing/2014/main" id="{6CCA2731-61C9-6CCC-2661-B8FE8C11D4C5}"/>
+                        </a:ext>
+                      </a:extLst>
+                    </p:cNvPr>
+                    <p:cNvSpPr/>
+                    <p:nvPr/>
+                  </p:nvSpPr>
+                  <p:spPr>
+                    <a:xfrm rot="16200000">
+                      <a:off x="6253354" y="3271646"/>
+                      <a:ext cx="142872" cy="457580"/>
+                    </a:xfrm>
+                    <a:prstGeom prst="leftBrace">
+                      <a:avLst/>
+                    </a:prstGeom>
+                    <a:ln w="19050">
+                      <a:solidFill>
+                        <a:srgbClr val="00B050"/>
+                      </a:solidFill>
+                    </a:ln>
+                  </p:spPr>
+                  <p:style>
+                    <a:lnRef idx="1">
+                      <a:schemeClr val="dk1"/>
+                    </a:lnRef>
+                    <a:fillRef idx="0">
+                      <a:schemeClr val="dk1"/>
+                    </a:fillRef>
+                    <a:effectRef idx="0">
+                      <a:schemeClr val="dk1"/>
+                    </a:effectRef>
+                    <a:fontRef idx="minor">
+                      <a:schemeClr val="tx1"/>
+                    </a:fontRef>
+                  </p:style>
+                  <p:txBody>
+                    <a:bodyPr rtlCol="0" anchor="ctr"/>
+                    <a:lstStyle/>
+                    <a:p>
+                      <a:pPr algn="ctr"/>
+                      <a:endParaRPr lang="zh-CN" altLang="en-US"/>
+                    </a:p>
+                  </p:txBody>
+                </p:sp>
+                <mc:AlternateContent xmlns:mc="http://schemas.openxmlformats.org/markup-compatibility/2006">
+                  <mc:Choice xmlns:a14="http://schemas.microsoft.com/office/drawing/2010/main" Requires="a14">
+                    <p:sp>
+                      <p:nvSpPr>
+                        <p:cNvPr id="65" name="TextBox 64">
+                          <a:extLst>
+                            <a:ext uri="{FF2B5EF4-FFF2-40B4-BE49-F238E27FC236}">
+                              <a16:creationId xmlns:a16="http://schemas.microsoft.com/office/drawing/2014/main" id="{D111A557-4C5C-4494-4AA2-8217A6EDF03F}"/>
+                            </a:ext>
+                          </a:extLst>
+                        </p:cNvPr>
+                        <p:cNvSpPr txBox="1"/>
+                        <p:nvPr/>
+                      </p:nvSpPr>
+                      <p:spPr>
+                        <a:xfrm>
+                          <a:off x="6114089" y="3571872"/>
+                          <a:ext cx="461921" cy="200055"/>
+                        </a:xfrm>
+                        <a:prstGeom prst="rect">
+                          <a:avLst/>
+                        </a:prstGeom>
+                        <a:noFill/>
+                      </p:spPr>
+                      <p:txBody>
+                        <a:bodyPr wrap="none" rtlCol="0">
+                          <a:spAutoFit/>
+                        </a:bodyPr>
+                        <a:lstStyle/>
+                        <a:p>
+                          <a14:m>
+                            <m:oMathPara xmlns:m="http://schemas.openxmlformats.org/officeDocument/2006/math">
+                              <m:oMathParaPr>
+                                <m:jc m:val="centerGroup"/>
+                              </m:oMathParaPr>
+                              <m:oMath xmlns:m="http://schemas.openxmlformats.org/officeDocument/2006/math">
+                                <m:sSub>
+                                  <m:sSubPr>
+                                    <m:ctrlPr>
+                                      <a:rPr lang="en-US" altLang="zh-CN" sz="700" i="1" smtClean="0">
+                                        <a:latin typeface="Cambria Math" panose="02040503050406030204" pitchFamily="18" charset="0"/>
+                                        <a:cs typeface="Times New Roman" panose="02020603050405020304" pitchFamily="18" charset="0"/>
+                                      </a:rPr>
+                                    </m:ctrlPr>
+                                  </m:sSubPr>
+                                  <m:e>
+                                    <m:r>
+                                      <a:rPr lang="en-US" altLang="zh-CN" sz="700" b="0" i="1" smtClean="0">
+                                        <a:latin typeface="Cambria Math" panose="02040503050406030204" pitchFamily="18" charset="0"/>
+                                        <a:cs typeface="Times New Roman" panose="02020603050405020304" pitchFamily="18" charset="0"/>
+                                      </a:rPr>
+                                      <m:t>𝑔𝑙𝑜𝑠𝑠</m:t>
+                                    </m:r>
+                                  </m:e>
+                                  <m:sub>
+                                    <m:r>
+                                      <a:rPr lang="en-US" altLang="zh-CN" sz="700" b="0" i="1" smtClean="0">
+                                        <a:latin typeface="Cambria Math" panose="02040503050406030204" pitchFamily="18" charset="0"/>
+                                        <a:cs typeface="Times New Roman" panose="02020603050405020304" pitchFamily="18" charset="0"/>
+                                      </a:rPr>
+                                      <m:t>2</m:t>
+                                    </m:r>
+                                  </m:sub>
+                                </m:sSub>
+                              </m:oMath>
+                            </m:oMathPara>
+                          </a14:m>
+                          <a:endParaRPr lang="zh-CN" altLang="en-US" sz="700" dirty="0">
+                            <a:latin typeface="Times New Roman" panose="02020603050405020304" pitchFamily="18" charset="0"/>
+                            <a:cs typeface="Times New Roman" panose="02020603050405020304" pitchFamily="18" charset="0"/>
+                          </a:endParaRPr>
+                        </a:p>
+                      </p:txBody>
+                    </p:sp>
+                  </mc:Choice>
+                  <mc:Fallback>
+                    <p:sp>
+                      <p:nvSpPr>
+                        <p:cNvPr id="65" name="TextBox 64">
+                          <a:extLst>
+                            <a:ext uri="{FF2B5EF4-FFF2-40B4-BE49-F238E27FC236}">
+                              <a16:creationId xmlns:a16="http://schemas.microsoft.com/office/drawing/2014/main" id="{D111A557-4C5C-4494-4AA2-8217A6EDF03F}"/>
+                            </a:ext>
+                          </a:extLst>
+                        </p:cNvPr>
+                        <p:cNvSpPr txBox="1">
+                          <a:spLocks noRot="1" noChangeAspect="1" noMove="1" noResize="1" noEditPoints="1" noAdjustHandles="1" noChangeArrowheads="1" noChangeShapeType="1" noTextEdit="1"/>
+                        </p:cNvSpPr>
+                        <p:nvPr/>
+                      </p:nvSpPr>
+                      <p:spPr>
+                        <a:xfrm>
+                          <a:off x="6114089" y="3571872"/>
+                          <a:ext cx="461921" cy="200055"/>
+                        </a:xfrm>
+                        <a:prstGeom prst="rect">
+                          <a:avLst/>
+                        </a:prstGeom>
+                        <a:blipFill>
+                          <a:blip r:embed="rId12"/>
+                          <a:stretch>
+                            <a:fillRect/>
+                          </a:stretch>
+                        </a:blipFill>
+                      </p:spPr>
+                      <p:txBody>
+                        <a:bodyPr/>
+                        <a:lstStyle/>
+                        <a:p>
+                          <a:r>
+                            <a:rPr lang="zh-CN" altLang="en-US">
+                              <a:noFill/>
+                            </a:rPr>
+                            <a:t> </a:t>
+                          </a:r>
+                        </a:p>
+                      </p:txBody>
+                    </p:sp>
+                  </mc:Fallback>
+                </mc:AlternateContent>
+              </p:grpSp>
+              <p:grpSp>
+                <p:nvGrpSpPr>
+                  <p:cNvPr id="66" name="Group 65">
+                    <a:extLst>
+                      <a:ext uri="{FF2B5EF4-FFF2-40B4-BE49-F238E27FC236}">
+                        <a16:creationId xmlns:a16="http://schemas.microsoft.com/office/drawing/2014/main" id="{FB1C4CF2-BECE-64B8-6188-DDEDECFA065E}"/>
+                      </a:ext>
+                    </a:extLst>
+                  </p:cNvPr>
+                  <p:cNvGrpSpPr/>
+                  <p:nvPr/>
+                </p:nvGrpSpPr>
+                <p:grpSpPr>
+                  <a:xfrm rot="5400000">
+                    <a:off x="5679819" y="2128711"/>
+                    <a:ext cx="480010" cy="342927"/>
+                    <a:chOff x="6096000" y="3429000"/>
+                    <a:chExt cx="480010" cy="342927"/>
+                  </a:xfrm>
+                </p:grpSpPr>
+                <p:sp>
+                  <p:nvSpPr>
+                    <p:cNvPr id="67" name="Left Brace 66">
+                      <a:extLst>
+                        <a:ext uri="{FF2B5EF4-FFF2-40B4-BE49-F238E27FC236}">
+                          <a16:creationId xmlns:a16="http://schemas.microsoft.com/office/drawing/2014/main" id="{6EE8BCF7-0B1E-8943-B99F-CA11A920919E}"/>
+                        </a:ext>
+                      </a:extLst>
+                    </p:cNvPr>
+                    <p:cNvSpPr/>
+                    <p:nvPr/>
+                  </p:nvSpPr>
+                  <p:spPr>
+                    <a:xfrm rot="16200000">
+                      <a:off x="6253354" y="3271646"/>
+                      <a:ext cx="142872" cy="457580"/>
+                    </a:xfrm>
+                    <a:prstGeom prst="leftBrace">
+                      <a:avLst/>
+                    </a:prstGeom>
+                    <a:ln w="19050">
+                      <a:solidFill>
+                        <a:srgbClr val="00B050"/>
+                      </a:solidFill>
+                    </a:ln>
+                  </p:spPr>
+                  <p:style>
+                    <a:lnRef idx="1">
+                      <a:schemeClr val="dk1"/>
+                    </a:lnRef>
+                    <a:fillRef idx="0">
+                      <a:schemeClr val="dk1"/>
+                    </a:fillRef>
+                    <a:effectRef idx="0">
+                      <a:schemeClr val="dk1"/>
+                    </a:effectRef>
+                    <a:fontRef idx="minor">
+                      <a:schemeClr val="tx1"/>
+                    </a:fontRef>
+                  </p:style>
+                  <p:txBody>
+                    <a:bodyPr rtlCol="0" anchor="ctr"/>
+                    <a:lstStyle/>
+                    <a:p>
+                      <a:pPr algn="ctr"/>
+                      <a:endParaRPr lang="zh-CN" altLang="en-US"/>
+                    </a:p>
+                  </p:txBody>
+                </p:sp>
+                <mc:AlternateContent xmlns:mc="http://schemas.openxmlformats.org/markup-compatibility/2006">
+                  <mc:Choice xmlns:a14="http://schemas.microsoft.com/office/drawing/2010/main" Requires="a14">
+                    <p:sp>
+                      <p:nvSpPr>
+                        <p:cNvPr id="68" name="TextBox 67">
+                          <a:extLst>
+                            <a:ext uri="{FF2B5EF4-FFF2-40B4-BE49-F238E27FC236}">
+                              <a16:creationId xmlns:a16="http://schemas.microsoft.com/office/drawing/2014/main" id="{943E0C91-D0EF-BE86-EB77-EBF23C0D2C42}"/>
+                            </a:ext>
+                          </a:extLst>
+                        </p:cNvPr>
+                        <p:cNvSpPr txBox="1"/>
+                        <p:nvPr/>
+                      </p:nvSpPr>
+                      <p:spPr>
+                        <a:xfrm>
+                          <a:off x="6114089" y="3571872"/>
+                          <a:ext cx="461921" cy="200055"/>
+                        </a:xfrm>
+                        <a:prstGeom prst="rect">
+                          <a:avLst/>
+                        </a:prstGeom>
+                        <a:noFill/>
+                      </p:spPr>
+                      <p:txBody>
+                        <a:bodyPr wrap="none" rtlCol="0">
+                          <a:spAutoFit/>
+                        </a:bodyPr>
+                        <a:lstStyle/>
+                        <a:p>
+                          <a14:m>
+                            <m:oMathPara xmlns:m="http://schemas.openxmlformats.org/officeDocument/2006/math">
+                              <m:oMathParaPr>
+                                <m:jc m:val="centerGroup"/>
+                              </m:oMathParaPr>
+                              <m:oMath xmlns:m="http://schemas.openxmlformats.org/officeDocument/2006/math">
+                                <m:sSub>
+                                  <m:sSubPr>
+                                    <m:ctrlPr>
+                                      <a:rPr lang="en-US" altLang="zh-CN" sz="700" i="1" smtClean="0">
+                                        <a:latin typeface="Cambria Math" panose="02040503050406030204" pitchFamily="18" charset="0"/>
+                                        <a:cs typeface="Times New Roman" panose="02020603050405020304" pitchFamily="18" charset="0"/>
+                                      </a:rPr>
+                                    </m:ctrlPr>
+                                  </m:sSubPr>
+                                  <m:e>
+                                    <m:r>
+                                      <a:rPr lang="en-US" altLang="zh-CN" sz="700" b="0" i="1" smtClean="0">
+                                        <a:latin typeface="Cambria Math" panose="02040503050406030204" pitchFamily="18" charset="0"/>
+                                        <a:cs typeface="Times New Roman" panose="02020603050405020304" pitchFamily="18" charset="0"/>
+                                      </a:rPr>
+                                      <m:t>𝑔𝑙𝑜𝑠𝑠</m:t>
+                                    </m:r>
+                                  </m:e>
+                                  <m:sub>
+                                    <m:r>
+                                      <a:rPr lang="en-US" altLang="zh-CN" sz="700" b="0" i="1" smtClean="0">
+                                        <a:latin typeface="Cambria Math" panose="02040503050406030204" pitchFamily="18" charset="0"/>
+                                        <a:cs typeface="Times New Roman" panose="02020603050405020304" pitchFamily="18" charset="0"/>
+                                      </a:rPr>
+                                      <m:t>3</m:t>
+                                    </m:r>
+                                  </m:sub>
+                                </m:sSub>
+                              </m:oMath>
+                            </m:oMathPara>
+                          </a14:m>
+                          <a:endParaRPr lang="zh-CN" altLang="en-US" sz="700" dirty="0">
+                            <a:latin typeface="Times New Roman" panose="02020603050405020304" pitchFamily="18" charset="0"/>
+                            <a:cs typeface="Times New Roman" panose="02020603050405020304" pitchFamily="18" charset="0"/>
+                          </a:endParaRPr>
+                        </a:p>
+                      </p:txBody>
+                    </p:sp>
+                  </mc:Choice>
+                  <mc:Fallback>
+                    <p:sp>
+                      <p:nvSpPr>
+                        <p:cNvPr id="68" name="TextBox 67">
+                          <a:extLst>
+                            <a:ext uri="{FF2B5EF4-FFF2-40B4-BE49-F238E27FC236}">
+                              <a16:creationId xmlns:a16="http://schemas.microsoft.com/office/drawing/2014/main" id="{943E0C91-D0EF-BE86-EB77-EBF23C0D2C42}"/>
+                            </a:ext>
+                          </a:extLst>
+                        </p:cNvPr>
+                        <p:cNvSpPr txBox="1">
+                          <a:spLocks noRot="1" noChangeAspect="1" noMove="1" noResize="1" noEditPoints="1" noAdjustHandles="1" noChangeArrowheads="1" noChangeShapeType="1" noTextEdit="1"/>
+                        </p:cNvSpPr>
+                        <p:nvPr/>
+                      </p:nvSpPr>
+                      <p:spPr>
+                        <a:xfrm>
+                          <a:off x="6114089" y="3571872"/>
+                          <a:ext cx="461921" cy="200055"/>
+                        </a:xfrm>
+                        <a:prstGeom prst="rect">
+                          <a:avLst/>
+                        </a:prstGeom>
+                        <a:blipFill>
+                          <a:blip r:embed="rId13"/>
+                          <a:stretch>
+                            <a:fillRect/>
+                          </a:stretch>
+                        </a:blipFill>
+                      </p:spPr>
+                      <p:txBody>
+                        <a:bodyPr/>
+                        <a:lstStyle/>
+                        <a:p>
+                          <a:r>
+                            <a:rPr lang="zh-CN" altLang="en-US">
+                              <a:noFill/>
+                            </a:rPr>
+                            <a:t> </a:t>
+                          </a:r>
+                        </a:p>
+                      </p:txBody>
+                    </p:sp>
+                  </mc:Fallback>
+                </mc:AlternateContent>
+              </p:grpSp>
+              <p:grpSp>
+                <p:nvGrpSpPr>
+                  <p:cNvPr id="69" name="Group 68">
+                    <a:extLst>
+                      <a:ext uri="{FF2B5EF4-FFF2-40B4-BE49-F238E27FC236}">
+                        <a16:creationId xmlns:a16="http://schemas.microsoft.com/office/drawing/2014/main" id="{E3D62941-F17D-2DB2-771E-66E42D246C9E}"/>
+                      </a:ext>
+                    </a:extLst>
+                  </p:cNvPr>
+                  <p:cNvGrpSpPr/>
+                  <p:nvPr/>
+                </p:nvGrpSpPr>
+                <p:grpSpPr>
+                  <a:xfrm rot="5400000">
+                    <a:off x="5680268" y="1668394"/>
+                    <a:ext cx="479112" cy="342927"/>
+                    <a:chOff x="6096000" y="3429000"/>
+                    <a:chExt cx="479112" cy="342927"/>
+                  </a:xfrm>
+                </p:grpSpPr>
+                <p:sp>
+                  <p:nvSpPr>
+                    <p:cNvPr id="70" name="Left Brace 69">
+                      <a:extLst>
+                        <a:ext uri="{FF2B5EF4-FFF2-40B4-BE49-F238E27FC236}">
+                          <a16:creationId xmlns:a16="http://schemas.microsoft.com/office/drawing/2014/main" id="{9DA4ABE1-63DB-1A47-B6D2-F9C1BC544D81}"/>
+                        </a:ext>
+                      </a:extLst>
+                    </p:cNvPr>
+                    <p:cNvSpPr/>
+                    <p:nvPr/>
+                  </p:nvSpPr>
+                  <p:spPr>
+                    <a:xfrm rot="16200000">
+                      <a:off x="6253354" y="3271646"/>
+                      <a:ext cx="142872" cy="457580"/>
+                    </a:xfrm>
+                    <a:prstGeom prst="leftBrace">
+                      <a:avLst/>
+                    </a:prstGeom>
+                    <a:ln w="19050">
+                      <a:solidFill>
+                        <a:srgbClr val="00B050"/>
+                      </a:solidFill>
+                    </a:ln>
+                  </p:spPr>
+                  <p:style>
+                    <a:lnRef idx="1">
+                      <a:schemeClr val="dk1"/>
+                    </a:lnRef>
+                    <a:fillRef idx="0">
+                      <a:schemeClr val="dk1"/>
+                    </a:fillRef>
+                    <a:effectRef idx="0">
+                      <a:schemeClr val="dk1"/>
+                    </a:effectRef>
+                    <a:fontRef idx="minor">
+                      <a:schemeClr val="tx1"/>
+                    </a:fontRef>
+                  </p:style>
+                  <p:txBody>
+                    <a:bodyPr rtlCol="0" anchor="ctr"/>
+                    <a:lstStyle/>
+                    <a:p>
+                      <a:pPr algn="ctr"/>
+                      <a:endParaRPr lang="zh-CN" altLang="en-US"/>
+                    </a:p>
+                  </p:txBody>
+                </p:sp>
+                <mc:AlternateContent xmlns:mc="http://schemas.openxmlformats.org/markup-compatibility/2006">
+                  <mc:Choice xmlns:a14="http://schemas.microsoft.com/office/drawing/2010/main" Requires="a14">
+                    <p:sp>
+                      <p:nvSpPr>
+                        <p:cNvPr id="71" name="TextBox 70">
+                          <a:extLst>
+                            <a:ext uri="{FF2B5EF4-FFF2-40B4-BE49-F238E27FC236}">
+                              <a16:creationId xmlns:a16="http://schemas.microsoft.com/office/drawing/2014/main" id="{FE09EB1D-4ECE-BA5A-D327-E09496E5BC79}"/>
+                            </a:ext>
+                          </a:extLst>
+                        </p:cNvPr>
+                        <p:cNvSpPr txBox="1"/>
+                        <p:nvPr/>
+                      </p:nvSpPr>
+                      <p:spPr>
+                        <a:xfrm>
+                          <a:off x="6114986" y="3571872"/>
+                          <a:ext cx="460126" cy="200055"/>
+                        </a:xfrm>
+                        <a:prstGeom prst="rect">
+                          <a:avLst/>
+                        </a:prstGeom>
+                        <a:noFill/>
+                      </p:spPr>
+                      <p:txBody>
+                        <a:bodyPr wrap="none" rtlCol="0">
+                          <a:spAutoFit/>
+                        </a:bodyPr>
+                        <a:lstStyle/>
+                        <a:p>
+                          <a14:m>
+                            <m:oMathPara xmlns:m="http://schemas.openxmlformats.org/officeDocument/2006/math">
+                              <m:oMathParaPr>
+                                <m:jc m:val="centerGroup"/>
+                              </m:oMathParaPr>
+                              <m:oMath xmlns:m="http://schemas.openxmlformats.org/officeDocument/2006/math">
+                                <m:sSub>
+                                  <m:sSubPr>
+                                    <m:ctrlPr>
+                                      <a:rPr lang="en-US" altLang="zh-CN" sz="700" i="1" smtClean="0">
+                                        <a:latin typeface="Cambria Math" panose="02040503050406030204" pitchFamily="18" charset="0"/>
+                                        <a:cs typeface="Times New Roman" panose="02020603050405020304" pitchFamily="18" charset="0"/>
+                                      </a:rPr>
+                                    </m:ctrlPr>
+                                  </m:sSubPr>
+                                  <m:e>
+                                    <m:r>
+                                      <a:rPr lang="en-US" altLang="zh-CN" sz="700" b="0" i="1" smtClean="0">
+                                        <a:latin typeface="Cambria Math" panose="02040503050406030204" pitchFamily="18" charset="0"/>
+                                        <a:cs typeface="Times New Roman" panose="02020603050405020304" pitchFamily="18" charset="0"/>
+                                      </a:rPr>
+                                      <m:t>𝑔𝑙𝑜𝑠𝑠</m:t>
+                                    </m:r>
+                                  </m:e>
+                                  <m:sub>
+                                    <m:r>
+                                      <a:rPr lang="en-US" altLang="zh-CN" sz="700" b="0" i="1" smtClean="0">
+                                        <a:latin typeface="Cambria Math" panose="02040503050406030204" pitchFamily="18" charset="0"/>
+                                        <a:cs typeface="Times New Roman" panose="02020603050405020304" pitchFamily="18" charset="0"/>
+                                      </a:rPr>
+                                      <m:t>4</m:t>
+                                    </m:r>
+                                  </m:sub>
+                                </m:sSub>
+                              </m:oMath>
+                            </m:oMathPara>
+                          </a14:m>
+                          <a:endParaRPr lang="zh-CN" altLang="en-US" sz="700" dirty="0">
+                            <a:latin typeface="Times New Roman" panose="02020603050405020304" pitchFamily="18" charset="0"/>
+                            <a:cs typeface="Times New Roman" panose="02020603050405020304" pitchFamily="18" charset="0"/>
+                          </a:endParaRPr>
+                        </a:p>
+                      </p:txBody>
+                    </p:sp>
+                  </mc:Choice>
+                  <mc:Fallback>
+                    <p:sp>
+                      <p:nvSpPr>
+                        <p:cNvPr id="71" name="TextBox 70">
+                          <a:extLst>
+                            <a:ext uri="{FF2B5EF4-FFF2-40B4-BE49-F238E27FC236}">
+                              <a16:creationId xmlns:a16="http://schemas.microsoft.com/office/drawing/2014/main" id="{FE09EB1D-4ECE-BA5A-D327-E09496E5BC79}"/>
+                            </a:ext>
+                          </a:extLst>
+                        </p:cNvPr>
+                        <p:cNvSpPr txBox="1">
+                          <a:spLocks noRot="1" noChangeAspect="1" noMove="1" noResize="1" noEditPoints="1" noAdjustHandles="1" noChangeArrowheads="1" noChangeShapeType="1" noTextEdit="1"/>
+                        </p:cNvSpPr>
+                        <p:nvPr/>
+                      </p:nvSpPr>
+                      <p:spPr>
+                        <a:xfrm>
+                          <a:off x="6114986" y="3571872"/>
+                          <a:ext cx="460126" cy="200055"/>
+                        </a:xfrm>
+                        <a:prstGeom prst="rect">
+                          <a:avLst/>
+                        </a:prstGeom>
+                        <a:blipFill>
+                          <a:blip r:embed="rId14"/>
+                          <a:stretch>
+                            <a:fillRect/>
+                          </a:stretch>
+                        </a:blipFill>
+                      </p:spPr>
+                      <p:txBody>
+                        <a:bodyPr/>
+                        <a:lstStyle/>
+                        <a:p>
+                          <a:r>
+                            <a:rPr lang="zh-CN" altLang="en-US">
+                              <a:noFill/>
+                            </a:rPr>
+                            <a:t> </a:t>
+                          </a:r>
+                        </a:p>
+                      </p:txBody>
+                    </p:sp>
+                  </mc:Fallback>
+                </mc:AlternateContent>
+              </p:grpSp>
+              <p:grpSp>
+                <p:nvGrpSpPr>
+                  <p:cNvPr id="72" name="Group 71">
+                    <a:extLst>
+                      <a:ext uri="{FF2B5EF4-FFF2-40B4-BE49-F238E27FC236}">
+                        <a16:creationId xmlns:a16="http://schemas.microsoft.com/office/drawing/2014/main" id="{29D0DA6E-5E73-FC9F-B1E0-B7597F7F7AA7}"/>
+                      </a:ext>
+                    </a:extLst>
+                  </p:cNvPr>
+                  <p:cNvGrpSpPr/>
+                  <p:nvPr/>
+                </p:nvGrpSpPr>
+                <p:grpSpPr>
+                  <a:xfrm rot="5400000">
+                    <a:off x="5679819" y="1208975"/>
+                    <a:ext cx="480010" cy="342927"/>
+                    <a:chOff x="6096000" y="3429000"/>
+                    <a:chExt cx="480010" cy="342927"/>
+                  </a:xfrm>
+                </p:grpSpPr>
+                <p:sp>
+                  <p:nvSpPr>
+                    <p:cNvPr id="73" name="Left Brace 72">
+                      <a:extLst>
+                        <a:ext uri="{FF2B5EF4-FFF2-40B4-BE49-F238E27FC236}">
+                          <a16:creationId xmlns:a16="http://schemas.microsoft.com/office/drawing/2014/main" id="{81F9B61F-A39E-9E52-6614-A5B2A49DB7BD}"/>
+                        </a:ext>
+                      </a:extLst>
+                    </p:cNvPr>
+                    <p:cNvSpPr/>
+                    <p:nvPr/>
+                  </p:nvSpPr>
+                  <p:spPr>
+                    <a:xfrm rot="16200000">
+                      <a:off x="6253354" y="3271646"/>
+                      <a:ext cx="142872" cy="457580"/>
+                    </a:xfrm>
+                    <a:prstGeom prst="leftBrace">
+                      <a:avLst/>
+                    </a:prstGeom>
+                    <a:ln w="19050">
+                      <a:solidFill>
+                        <a:srgbClr val="00B050"/>
+                      </a:solidFill>
+                    </a:ln>
+                  </p:spPr>
+                  <p:style>
+                    <a:lnRef idx="1">
+                      <a:schemeClr val="dk1"/>
+                    </a:lnRef>
+                    <a:fillRef idx="0">
+                      <a:schemeClr val="dk1"/>
+                    </a:fillRef>
+                    <a:effectRef idx="0">
+                      <a:schemeClr val="dk1"/>
+                    </a:effectRef>
+                    <a:fontRef idx="minor">
+                      <a:schemeClr val="tx1"/>
+                    </a:fontRef>
+                  </p:style>
+                  <p:txBody>
+                    <a:bodyPr rtlCol="0" anchor="ctr"/>
+                    <a:lstStyle/>
+                    <a:p>
+                      <a:pPr algn="ctr"/>
+                      <a:endParaRPr lang="zh-CN" altLang="en-US"/>
+                    </a:p>
+                  </p:txBody>
+                </p:sp>
+                <mc:AlternateContent xmlns:mc="http://schemas.openxmlformats.org/markup-compatibility/2006">
+                  <mc:Choice xmlns:a14="http://schemas.microsoft.com/office/drawing/2010/main" Requires="a14">
+                    <p:sp>
+                      <p:nvSpPr>
+                        <p:cNvPr id="74" name="TextBox 73">
+                          <a:extLst>
+                            <a:ext uri="{FF2B5EF4-FFF2-40B4-BE49-F238E27FC236}">
+                              <a16:creationId xmlns:a16="http://schemas.microsoft.com/office/drawing/2014/main" id="{425FB9D9-A7F6-96DC-60B3-0785F8126100}"/>
+                            </a:ext>
+                          </a:extLst>
+                        </p:cNvPr>
+                        <p:cNvSpPr txBox="1"/>
+                        <p:nvPr/>
+                      </p:nvSpPr>
+                      <p:spPr>
+                        <a:xfrm>
+                          <a:off x="6114089" y="3571872"/>
+                          <a:ext cx="461921" cy="200055"/>
+                        </a:xfrm>
+                        <a:prstGeom prst="rect">
+                          <a:avLst/>
+                        </a:prstGeom>
+                        <a:noFill/>
+                      </p:spPr>
+                      <p:txBody>
+                        <a:bodyPr wrap="none" rtlCol="0">
+                          <a:spAutoFit/>
+                        </a:bodyPr>
+                        <a:lstStyle/>
+                        <a:p>
+                          <a14:m>
+                            <m:oMathPara xmlns:m="http://schemas.openxmlformats.org/officeDocument/2006/math">
+                              <m:oMathParaPr>
+                                <m:jc m:val="centerGroup"/>
+                              </m:oMathParaPr>
+                              <m:oMath xmlns:m="http://schemas.openxmlformats.org/officeDocument/2006/math">
+                                <m:sSub>
+                                  <m:sSubPr>
+                                    <m:ctrlPr>
+                                      <a:rPr lang="en-US" altLang="zh-CN" sz="700" i="1" smtClean="0">
+                                        <a:latin typeface="Cambria Math" panose="02040503050406030204" pitchFamily="18" charset="0"/>
+                                        <a:cs typeface="Times New Roman" panose="02020603050405020304" pitchFamily="18" charset="0"/>
+                                      </a:rPr>
+                                    </m:ctrlPr>
+                                  </m:sSubPr>
+                                  <m:e>
+                                    <m:r>
+                                      <a:rPr lang="en-US" altLang="zh-CN" sz="700" b="0" i="1" smtClean="0">
+                                        <a:latin typeface="Cambria Math" panose="02040503050406030204" pitchFamily="18" charset="0"/>
+                                        <a:cs typeface="Times New Roman" panose="02020603050405020304" pitchFamily="18" charset="0"/>
+                                      </a:rPr>
+                                      <m:t>𝑔𝑙𝑜𝑠𝑠</m:t>
+                                    </m:r>
+                                  </m:e>
+                                  <m:sub>
+                                    <m:r>
+                                      <a:rPr lang="en-US" altLang="zh-CN" sz="700" b="0" i="1" smtClean="0">
+                                        <a:latin typeface="Cambria Math" panose="02040503050406030204" pitchFamily="18" charset="0"/>
+                                        <a:cs typeface="Times New Roman" panose="02020603050405020304" pitchFamily="18" charset="0"/>
+                                      </a:rPr>
+                                      <m:t>5</m:t>
+                                    </m:r>
+                                  </m:sub>
+                                </m:sSub>
+                              </m:oMath>
+                            </m:oMathPara>
+                          </a14:m>
+                          <a:endParaRPr lang="zh-CN" altLang="en-US" sz="700" dirty="0">
+                            <a:latin typeface="Times New Roman" panose="02020603050405020304" pitchFamily="18" charset="0"/>
+                            <a:cs typeface="Times New Roman" panose="02020603050405020304" pitchFamily="18" charset="0"/>
+                          </a:endParaRPr>
+                        </a:p>
+                      </p:txBody>
+                    </p:sp>
+                  </mc:Choice>
+                  <mc:Fallback>
+                    <p:sp>
+                      <p:nvSpPr>
+                        <p:cNvPr id="74" name="TextBox 73">
+                          <a:extLst>
+                            <a:ext uri="{FF2B5EF4-FFF2-40B4-BE49-F238E27FC236}">
+                              <a16:creationId xmlns:a16="http://schemas.microsoft.com/office/drawing/2014/main" id="{425FB9D9-A7F6-96DC-60B3-0785F8126100}"/>
+                            </a:ext>
+                          </a:extLst>
+                        </p:cNvPr>
+                        <p:cNvSpPr txBox="1">
+                          <a:spLocks noRot="1" noChangeAspect="1" noMove="1" noResize="1" noEditPoints="1" noAdjustHandles="1" noChangeArrowheads="1" noChangeShapeType="1" noTextEdit="1"/>
+                        </p:cNvSpPr>
+                        <p:nvPr/>
+                      </p:nvSpPr>
+                      <p:spPr>
+                        <a:xfrm>
+                          <a:off x="6114089" y="3571872"/>
+                          <a:ext cx="461921" cy="200055"/>
+                        </a:xfrm>
+                        <a:prstGeom prst="rect">
+                          <a:avLst/>
+                        </a:prstGeom>
+                        <a:blipFill>
+                          <a:blip r:embed="rId15"/>
+                          <a:stretch>
+                            <a:fillRect/>
+                          </a:stretch>
+                        </a:blipFill>
+                      </p:spPr>
+                      <p:txBody>
+                        <a:bodyPr/>
+                        <a:lstStyle/>
+                        <a:p>
+                          <a:r>
+                            <a:rPr lang="zh-CN" altLang="en-US">
+                              <a:noFill/>
+                            </a:rPr>
+                            <a:t> </a:t>
+                          </a:r>
+                        </a:p>
+                      </p:txBody>
+                    </p:sp>
+                  </mc:Fallback>
+                </mc:AlternateContent>
+              </p:grpSp>
+            </p:grpSp>
+            <p:cxnSp>
+              <p:nvCxnSpPr>
+                <p:cNvPr id="79" name="Straight Connector 78">
+                  <a:extLst>
+                    <a:ext uri="{FF2B5EF4-FFF2-40B4-BE49-F238E27FC236}">
+                      <a16:creationId xmlns:a16="http://schemas.microsoft.com/office/drawing/2014/main" id="{41C73186-481B-4B26-6B3B-D15F334FA522}"/>
+                    </a:ext>
+                  </a:extLst>
+                </p:cNvPr>
+                <p:cNvCxnSpPr/>
+                <p:nvPr/>
+              </p:nvCxnSpPr>
+              <p:spPr>
+                <a:xfrm>
+                  <a:off x="5650992" y="3429000"/>
+                  <a:ext cx="4078224" cy="0"/>
+                </a:xfrm>
+                <a:prstGeom prst="line">
+                  <a:avLst/>
+                </a:prstGeom>
+                <a:ln>
+                  <a:prstDash val="dash"/>
+                </a:ln>
+              </p:spPr>
+              <p:style>
+                <a:lnRef idx="1">
+                  <a:schemeClr val="dk1"/>
+                </a:lnRef>
+                <a:fillRef idx="0">
+                  <a:schemeClr val="dk1"/>
+                </a:fillRef>
+                <a:effectRef idx="0">
+                  <a:schemeClr val="dk1"/>
+                </a:effectRef>
+                <a:fontRef idx="minor">
+                  <a:schemeClr val="tx1"/>
+                </a:fontRef>
+              </p:style>
+            </p:cxnSp>
+            <p:cxnSp>
+              <p:nvCxnSpPr>
+                <p:cNvPr id="80" name="Straight Connector 79">
+                  <a:extLst>
+                    <a:ext uri="{FF2B5EF4-FFF2-40B4-BE49-F238E27FC236}">
+                      <a16:creationId xmlns:a16="http://schemas.microsoft.com/office/drawing/2014/main" id="{44D52A08-0FF2-A1B6-F538-F4775FD2F836}"/>
+                    </a:ext>
+                  </a:extLst>
+                </p:cNvPr>
+                <p:cNvCxnSpPr/>
+                <p:nvPr/>
+              </p:nvCxnSpPr>
+              <p:spPr>
+                <a:xfrm>
+                  <a:off x="5650992" y="2965806"/>
+                  <a:ext cx="4078224" cy="0"/>
+                </a:xfrm>
+                <a:prstGeom prst="line">
+                  <a:avLst/>
+                </a:prstGeom>
+                <a:ln>
+                  <a:prstDash val="dash"/>
+                </a:ln>
+              </p:spPr>
+              <p:style>
+                <a:lnRef idx="1">
+                  <a:schemeClr val="dk1"/>
+                </a:lnRef>
+                <a:fillRef idx="0">
+                  <a:schemeClr val="dk1"/>
+                </a:fillRef>
+                <a:effectRef idx="0">
+                  <a:schemeClr val="dk1"/>
+                </a:effectRef>
+                <a:fontRef idx="minor">
+                  <a:schemeClr val="tx1"/>
+                </a:fontRef>
+              </p:style>
+            </p:cxnSp>
+            <p:cxnSp>
+              <p:nvCxnSpPr>
+                <p:cNvPr id="81" name="Straight Connector 80">
+                  <a:extLst>
+                    <a:ext uri="{FF2B5EF4-FFF2-40B4-BE49-F238E27FC236}">
+                      <a16:creationId xmlns:a16="http://schemas.microsoft.com/office/drawing/2014/main" id="{35CB8FD7-BED4-1073-6E12-AEAE3D60293B}"/>
+                    </a:ext>
+                  </a:extLst>
+                </p:cNvPr>
+                <p:cNvCxnSpPr/>
+                <p:nvPr/>
+              </p:nvCxnSpPr>
+              <p:spPr>
+                <a:xfrm>
+                  <a:off x="5650992" y="2502612"/>
+                  <a:ext cx="4078224" cy="0"/>
+                </a:xfrm>
+                <a:prstGeom prst="line">
+                  <a:avLst/>
+                </a:prstGeom>
+                <a:ln>
+                  <a:prstDash val="dash"/>
+                </a:ln>
+              </p:spPr>
+              <p:style>
+                <a:lnRef idx="1">
+                  <a:schemeClr val="dk1"/>
+                </a:lnRef>
+                <a:fillRef idx="0">
+                  <a:schemeClr val="dk1"/>
+                </a:fillRef>
+                <a:effectRef idx="0">
+                  <a:schemeClr val="dk1"/>
+                </a:effectRef>
+                <a:fontRef idx="minor">
+                  <a:schemeClr val="tx1"/>
+                </a:fontRef>
+              </p:style>
+            </p:cxnSp>
+            <p:cxnSp>
+              <p:nvCxnSpPr>
+                <p:cNvPr id="82" name="Straight Connector 81">
+                  <a:extLst>
+                    <a:ext uri="{FF2B5EF4-FFF2-40B4-BE49-F238E27FC236}">
+                      <a16:creationId xmlns:a16="http://schemas.microsoft.com/office/drawing/2014/main" id="{91E07E44-54BE-576C-5695-D2C8BB2F7777}"/>
+                    </a:ext>
+                  </a:extLst>
+                </p:cNvPr>
+                <p:cNvCxnSpPr/>
+                <p:nvPr/>
+              </p:nvCxnSpPr>
+              <p:spPr>
+                <a:xfrm>
+                  <a:off x="5650992" y="2039418"/>
+                  <a:ext cx="4078224" cy="0"/>
+                </a:xfrm>
+                <a:prstGeom prst="line">
+                  <a:avLst/>
+                </a:prstGeom>
+                <a:ln>
+                  <a:prstDash val="dash"/>
+                </a:ln>
+              </p:spPr>
+              <p:style>
+                <a:lnRef idx="1">
+                  <a:schemeClr val="dk1"/>
+                </a:lnRef>
+                <a:fillRef idx="0">
+                  <a:schemeClr val="dk1"/>
+                </a:fillRef>
+                <a:effectRef idx="0">
+                  <a:schemeClr val="dk1"/>
+                </a:effectRef>
+                <a:fontRef idx="minor">
+                  <a:schemeClr val="tx1"/>
+                </a:fontRef>
+              </p:style>
+            </p:cxnSp>
+            <p:cxnSp>
+              <p:nvCxnSpPr>
+                <p:cNvPr id="83" name="Straight Connector 82">
+                  <a:extLst>
+                    <a:ext uri="{FF2B5EF4-FFF2-40B4-BE49-F238E27FC236}">
+                      <a16:creationId xmlns:a16="http://schemas.microsoft.com/office/drawing/2014/main" id="{FBB223A7-5F47-006D-70E9-17AF08328E48}"/>
+                    </a:ext>
+                  </a:extLst>
+                </p:cNvPr>
+                <p:cNvCxnSpPr/>
+                <p:nvPr/>
+              </p:nvCxnSpPr>
+              <p:spPr>
+                <a:xfrm>
+                  <a:off x="5650992" y="1576224"/>
+                  <a:ext cx="4078224" cy="0"/>
+                </a:xfrm>
+                <a:prstGeom prst="line">
+                  <a:avLst/>
+                </a:prstGeom>
+                <a:ln>
+                  <a:prstDash val="dash"/>
+                </a:ln>
+              </p:spPr>
+              <p:style>
+                <a:lnRef idx="1">
+                  <a:schemeClr val="dk1"/>
+                </a:lnRef>
+                <a:fillRef idx="0">
+                  <a:schemeClr val="dk1"/>
+                </a:fillRef>
+                <a:effectRef idx="0">
+                  <a:schemeClr val="dk1"/>
+                </a:effectRef>
+                <a:fontRef idx="minor">
+                  <a:schemeClr val="tx1"/>
+                </a:fontRef>
+              </p:style>
+            </p:cxnSp>
+            <p:cxnSp>
+              <p:nvCxnSpPr>
+                <p:cNvPr id="89" name="Straight Connector 88">
+                  <a:extLst>
+                    <a:ext uri="{FF2B5EF4-FFF2-40B4-BE49-F238E27FC236}">
+                      <a16:creationId xmlns:a16="http://schemas.microsoft.com/office/drawing/2014/main" id="{4AEFDA02-CC5A-E6A0-FDA9-01EF25AA4DBE}"/>
+                    </a:ext>
+                  </a:extLst>
+                </p:cNvPr>
+                <p:cNvCxnSpPr>
+                  <a:cxnSpLocks/>
+                </p:cNvCxnSpPr>
+                <p:nvPr/>
+              </p:nvCxnSpPr>
+              <p:spPr>
+                <a:xfrm flipV="1">
+                  <a:off x="6092123" y="1591538"/>
+                  <a:ext cx="0" cy="2318454"/>
+                </a:xfrm>
+                <a:prstGeom prst="line">
+                  <a:avLst/>
+                </a:prstGeom>
+                <a:ln>
+                  <a:prstDash val="dash"/>
+                </a:ln>
+              </p:spPr>
+              <p:style>
+                <a:lnRef idx="1">
+                  <a:schemeClr val="dk1"/>
+                </a:lnRef>
+                <a:fillRef idx="0">
+                  <a:schemeClr val="dk1"/>
+                </a:fillRef>
+                <a:effectRef idx="0">
+                  <a:schemeClr val="dk1"/>
+                </a:effectRef>
+                <a:fontRef idx="minor">
+                  <a:schemeClr val="tx1"/>
+                </a:fontRef>
+              </p:style>
+            </p:cxnSp>
+            <p:cxnSp>
+              <p:nvCxnSpPr>
+                <p:cNvPr id="92" name="Straight Connector 91">
+                  <a:extLst>
+                    <a:ext uri="{FF2B5EF4-FFF2-40B4-BE49-F238E27FC236}">
+                      <a16:creationId xmlns:a16="http://schemas.microsoft.com/office/drawing/2014/main" id="{593AB490-D4A3-D78A-C1E9-9E9A4801A377}"/>
+                    </a:ext>
+                  </a:extLst>
+                </p:cNvPr>
+                <p:cNvCxnSpPr>
+                  <a:cxnSpLocks/>
+                </p:cNvCxnSpPr>
+                <p:nvPr/>
+              </p:nvCxnSpPr>
+              <p:spPr>
+                <a:xfrm flipV="1">
+                  <a:off x="6535300" y="1576224"/>
+                  <a:ext cx="0" cy="2318454"/>
+                </a:xfrm>
+                <a:prstGeom prst="line">
+                  <a:avLst/>
+                </a:prstGeom>
+                <a:ln>
+                  <a:prstDash val="dash"/>
+                </a:ln>
+              </p:spPr>
+              <p:style>
+                <a:lnRef idx="1">
+                  <a:schemeClr val="dk1"/>
+                </a:lnRef>
+                <a:fillRef idx="0">
+                  <a:schemeClr val="dk1"/>
+                </a:fillRef>
+                <a:effectRef idx="0">
+                  <a:schemeClr val="dk1"/>
+                </a:effectRef>
+                <a:fontRef idx="minor">
+                  <a:schemeClr val="tx1"/>
+                </a:fontRef>
+              </p:style>
+            </p:cxnSp>
+            <p:cxnSp>
+              <p:nvCxnSpPr>
+                <p:cNvPr id="97" name="Straight Connector 96">
+                  <a:extLst>
+                    <a:ext uri="{FF2B5EF4-FFF2-40B4-BE49-F238E27FC236}">
+                      <a16:creationId xmlns:a16="http://schemas.microsoft.com/office/drawing/2014/main" id="{61D48BE7-E088-C8AC-B410-EF892769B96C}"/>
+                    </a:ext>
+                  </a:extLst>
+                </p:cNvPr>
+                <p:cNvCxnSpPr>
+                  <a:cxnSpLocks/>
+                </p:cNvCxnSpPr>
+                <p:nvPr/>
+              </p:nvCxnSpPr>
+              <p:spPr>
+                <a:xfrm flipV="1">
+                  <a:off x="6988070" y="1573841"/>
+                  <a:ext cx="0" cy="2318454"/>
+                </a:xfrm>
+                <a:prstGeom prst="line">
+                  <a:avLst/>
+                </a:prstGeom>
+                <a:ln>
+                  <a:prstDash val="dash"/>
+                </a:ln>
+              </p:spPr>
+              <p:style>
+                <a:lnRef idx="1">
+                  <a:schemeClr val="dk1"/>
+                </a:lnRef>
+                <a:fillRef idx="0">
+                  <a:schemeClr val="dk1"/>
+                </a:fillRef>
+                <a:effectRef idx="0">
+                  <a:schemeClr val="dk1"/>
+                </a:effectRef>
+                <a:fontRef idx="minor">
+                  <a:schemeClr val="tx1"/>
+                </a:fontRef>
+              </p:style>
+            </p:cxnSp>
+            <p:cxnSp>
+              <p:nvCxnSpPr>
+                <p:cNvPr id="98" name="Straight Connector 97">
+                  <a:extLst>
+                    <a:ext uri="{FF2B5EF4-FFF2-40B4-BE49-F238E27FC236}">
+                      <a16:creationId xmlns:a16="http://schemas.microsoft.com/office/drawing/2014/main" id="{367F025F-8A95-222A-7502-9D657D84E8E6}"/>
+                    </a:ext>
+                  </a:extLst>
+                </p:cNvPr>
+                <p:cNvCxnSpPr>
+                  <a:cxnSpLocks/>
+                </p:cNvCxnSpPr>
+                <p:nvPr/>
+              </p:nvCxnSpPr>
+              <p:spPr>
+                <a:xfrm flipV="1">
+                  <a:off x="7443059" y="1570128"/>
+                  <a:ext cx="0" cy="2318454"/>
+                </a:xfrm>
+                <a:prstGeom prst="line">
+                  <a:avLst/>
+                </a:prstGeom>
+                <a:ln>
+                  <a:prstDash val="dash"/>
+                </a:ln>
+              </p:spPr>
+              <p:style>
+                <a:lnRef idx="1">
+                  <a:schemeClr val="dk1"/>
+                </a:lnRef>
+                <a:fillRef idx="0">
+                  <a:schemeClr val="dk1"/>
+                </a:fillRef>
+                <a:effectRef idx="0">
+                  <a:schemeClr val="dk1"/>
+                </a:effectRef>
+                <a:fontRef idx="minor">
+                  <a:schemeClr val="tx1"/>
+                </a:fontRef>
+              </p:style>
+            </p:cxnSp>
+            <p:cxnSp>
+              <p:nvCxnSpPr>
+                <p:cNvPr id="99" name="Straight Connector 98">
+                  <a:extLst>
+                    <a:ext uri="{FF2B5EF4-FFF2-40B4-BE49-F238E27FC236}">
+                      <a16:creationId xmlns:a16="http://schemas.microsoft.com/office/drawing/2014/main" id="{649EEDDC-9FA1-3E75-0D97-9DA40DC47D87}"/>
+                    </a:ext>
+                  </a:extLst>
+                </p:cNvPr>
+                <p:cNvCxnSpPr>
+                  <a:cxnSpLocks/>
+                </p:cNvCxnSpPr>
+                <p:nvPr/>
+              </p:nvCxnSpPr>
+              <p:spPr>
+                <a:xfrm flipV="1">
+                  <a:off x="7887514" y="1581267"/>
+                  <a:ext cx="0" cy="2318454"/>
+                </a:xfrm>
+                <a:prstGeom prst="line">
+                  <a:avLst/>
+                </a:prstGeom>
+                <a:ln>
+                  <a:prstDash val="dash"/>
+                </a:ln>
+              </p:spPr>
+              <p:style>
+                <a:lnRef idx="1">
+                  <a:schemeClr val="dk1"/>
+                </a:lnRef>
+                <a:fillRef idx="0">
+                  <a:schemeClr val="dk1"/>
+                </a:fillRef>
+                <a:effectRef idx="0">
+                  <a:schemeClr val="dk1"/>
+                </a:effectRef>
+                <a:fontRef idx="minor">
+                  <a:schemeClr val="tx1"/>
+                </a:fontRef>
+              </p:style>
+            </p:cxnSp>
+            <p:cxnSp>
+              <p:nvCxnSpPr>
+                <p:cNvPr id="100" name="Straight Connector 99">
+                  <a:extLst>
+                    <a:ext uri="{FF2B5EF4-FFF2-40B4-BE49-F238E27FC236}">
+                      <a16:creationId xmlns:a16="http://schemas.microsoft.com/office/drawing/2014/main" id="{831330AF-1F34-352B-7094-4C5ABE30EAEF}"/>
+                    </a:ext>
+                  </a:extLst>
+                </p:cNvPr>
+                <p:cNvCxnSpPr>
+                  <a:cxnSpLocks/>
+                </p:cNvCxnSpPr>
+                <p:nvPr/>
+              </p:nvCxnSpPr>
+              <p:spPr>
+                <a:xfrm flipV="1">
+                  <a:off x="8334188" y="1572788"/>
+                  <a:ext cx="0" cy="2318454"/>
+                </a:xfrm>
+                <a:prstGeom prst="line">
+                  <a:avLst/>
+                </a:prstGeom>
+                <a:ln>
+                  <a:prstDash val="dash"/>
+                </a:ln>
+              </p:spPr>
+              <p:style>
+                <a:lnRef idx="1">
+                  <a:schemeClr val="dk1"/>
+                </a:lnRef>
+                <a:fillRef idx="0">
+                  <a:schemeClr val="dk1"/>
+                </a:fillRef>
+                <a:effectRef idx="0">
+                  <a:schemeClr val="dk1"/>
+                </a:effectRef>
+                <a:fontRef idx="minor">
+                  <a:schemeClr val="tx1"/>
+                </a:fontRef>
+              </p:style>
+            </p:cxnSp>
+            <p:cxnSp>
+              <p:nvCxnSpPr>
+                <p:cNvPr id="101" name="Straight Connector 100">
+                  <a:extLst>
+                    <a:ext uri="{FF2B5EF4-FFF2-40B4-BE49-F238E27FC236}">
+                      <a16:creationId xmlns:a16="http://schemas.microsoft.com/office/drawing/2014/main" id="{13365324-55F1-4AE4-E1E4-2F40A42BC30F}"/>
+                    </a:ext>
+                  </a:extLst>
+                </p:cNvPr>
+                <p:cNvCxnSpPr>
+                  <a:cxnSpLocks/>
+                </p:cNvCxnSpPr>
+                <p:nvPr/>
+              </p:nvCxnSpPr>
+              <p:spPr>
+                <a:xfrm flipV="1">
+                  <a:off x="8786958" y="1582597"/>
+                  <a:ext cx="0" cy="2318454"/>
+                </a:xfrm>
+                <a:prstGeom prst="line">
+                  <a:avLst/>
+                </a:prstGeom>
+                <a:ln>
+                  <a:prstDash val="dash"/>
+                </a:ln>
+              </p:spPr>
+              <p:style>
+                <a:lnRef idx="1">
+                  <a:schemeClr val="dk1"/>
+                </a:lnRef>
+                <a:fillRef idx="0">
+                  <a:schemeClr val="dk1"/>
+                </a:fillRef>
+                <a:effectRef idx="0">
+                  <a:schemeClr val="dk1"/>
+                </a:effectRef>
+                <a:fontRef idx="minor">
+                  <a:schemeClr val="tx1"/>
+                </a:fontRef>
+              </p:style>
+            </p:cxnSp>
+            <p:cxnSp>
+              <p:nvCxnSpPr>
+                <p:cNvPr id="102" name="Straight Connector 101">
+                  <a:extLst>
+                    <a:ext uri="{FF2B5EF4-FFF2-40B4-BE49-F238E27FC236}">
+                      <a16:creationId xmlns:a16="http://schemas.microsoft.com/office/drawing/2014/main" id="{8EF3B89D-5DCF-72D5-B417-E2A2CD68BD29}"/>
+                    </a:ext>
+                  </a:extLst>
+                </p:cNvPr>
+                <p:cNvCxnSpPr>
+                  <a:cxnSpLocks/>
+                </p:cNvCxnSpPr>
+                <p:nvPr/>
+              </p:nvCxnSpPr>
+              <p:spPr>
+                <a:xfrm flipV="1">
+                  <a:off x="9233632" y="1580214"/>
+                  <a:ext cx="0" cy="2318454"/>
+                </a:xfrm>
+                <a:prstGeom prst="line">
+                  <a:avLst/>
+                </a:prstGeom>
+                <a:ln>
+                  <a:prstDash val="dash"/>
+                </a:ln>
+              </p:spPr>
+              <p:style>
+                <a:lnRef idx="1">
+                  <a:schemeClr val="dk1"/>
+                </a:lnRef>
+                <a:fillRef idx="0">
+                  <a:schemeClr val="dk1"/>
+                </a:fillRef>
+                <a:effectRef idx="0">
+                  <a:schemeClr val="dk1"/>
+                </a:effectRef>
+                <a:fontRef idx="minor">
+                  <a:schemeClr val="tx1"/>
+                </a:fontRef>
+              </p:style>
+            </p:cxnSp>
+            <p:cxnSp>
+              <p:nvCxnSpPr>
+                <p:cNvPr id="103" name="Straight Connector 102">
+                  <a:extLst>
+                    <a:ext uri="{FF2B5EF4-FFF2-40B4-BE49-F238E27FC236}">
+                      <a16:creationId xmlns:a16="http://schemas.microsoft.com/office/drawing/2014/main" id="{CEB829A8-8F7A-D8D9-9DB3-55BF8B18B4D2}"/>
+                    </a:ext>
+                  </a:extLst>
+                </p:cNvPr>
+                <p:cNvCxnSpPr>
+                  <a:cxnSpLocks/>
+                </p:cNvCxnSpPr>
+                <p:nvPr/>
+              </p:nvCxnSpPr>
+              <p:spPr>
+                <a:xfrm flipV="1">
+                  <a:off x="9692498" y="1571735"/>
+                  <a:ext cx="0" cy="2318454"/>
+                </a:xfrm>
+                <a:prstGeom prst="line">
+                  <a:avLst/>
+                </a:prstGeom>
+                <a:ln>
+                  <a:prstDash val="dash"/>
+                </a:ln>
+              </p:spPr>
+              <p:style>
+                <a:lnRef idx="1">
+                  <a:schemeClr val="dk1"/>
+                </a:lnRef>
+                <a:fillRef idx="0">
+                  <a:schemeClr val="dk1"/>
+                </a:fillRef>
+                <a:effectRef idx="0">
+                  <a:schemeClr val="dk1"/>
+                </a:effectRef>
+                <a:fontRef idx="minor">
+                  <a:schemeClr val="tx1"/>
+                </a:fontRef>
+              </p:style>
+            </p:cxnSp>
+          </p:grpSp>
+          <p:sp>
+            <p:nvSpPr>
+              <p:cNvPr id="105" name="Rectangle 104">
+                <a:extLst>
+                  <a:ext uri="{FF2B5EF4-FFF2-40B4-BE49-F238E27FC236}">
+                    <a16:creationId xmlns:a16="http://schemas.microsoft.com/office/drawing/2014/main" id="{1D0DC99E-7966-8C0E-5258-546509BD89B4}"/>
+                  </a:ext>
+                </a:extLst>
+              </p:cNvPr>
+              <p:cNvSpPr/>
+              <p:nvPr/>
+            </p:nvSpPr>
+            <p:spPr>
+              <a:xfrm>
+                <a:off x="3255264" y="2840736"/>
+                <a:ext cx="445008" cy="432816"/>
+              </a:xfrm>
+              <a:prstGeom prst="rect">
+                <a:avLst/>
+              </a:prstGeom>
+              <a:solidFill>
+                <a:srgbClr val="00B0F0"/>
+              </a:solidFill>
+              <a:ln>
+                <a:noFill/>
+              </a:ln>
+            </p:spPr>
+            <p:style>
+              <a:lnRef idx="2">
+                <a:schemeClr val="accent1">
+                  <a:shade val="15000"/>
+                </a:schemeClr>
+              </a:lnRef>
+              <a:fillRef idx="1">
+                <a:schemeClr val="accent1"/>
+              </a:fillRef>
+              <a:effectRef idx="0">
+                <a:schemeClr val="accent1"/>
+              </a:effectRef>
+              <a:fontRef idx="minor">
+                <a:schemeClr val="lt1"/>
+              </a:fontRef>
+            </p:style>
+            <p:txBody>
+              <a:bodyPr rtlCol="0" anchor="ctr"/>
+              <a:lstStyle/>
+              <a:p>
+                <a:pPr algn="ctr"/>
+                <a:endParaRPr lang="zh-CN" altLang="en-US"/>
+              </a:p>
+            </p:txBody>
+          </p:sp>
+          <p:sp>
+            <p:nvSpPr>
+              <p:cNvPr id="106" name="Rectangle 105">
+                <a:extLst>
+                  <a:ext uri="{FF2B5EF4-FFF2-40B4-BE49-F238E27FC236}">
+                    <a16:creationId xmlns:a16="http://schemas.microsoft.com/office/drawing/2014/main" id="{31880B0D-B677-E2C6-DE8F-2ADF004E3C11}"/>
+                  </a:ext>
+                </a:extLst>
+              </p:cNvPr>
+              <p:cNvSpPr/>
+              <p:nvPr/>
+            </p:nvSpPr>
+            <p:spPr>
+              <a:xfrm>
+                <a:off x="3699551" y="2841201"/>
+                <a:ext cx="445008" cy="432816"/>
+              </a:xfrm>
+              <a:prstGeom prst="rect">
+                <a:avLst/>
+              </a:prstGeom>
+              <a:solidFill>
+                <a:srgbClr val="00B0F0"/>
+              </a:solidFill>
+              <a:ln>
+                <a:noFill/>
+              </a:ln>
+            </p:spPr>
+            <p:style>
+              <a:lnRef idx="2">
+                <a:schemeClr val="accent1">
+                  <a:shade val="15000"/>
+                </a:schemeClr>
+              </a:lnRef>
+              <a:fillRef idx="1">
+                <a:schemeClr val="accent1"/>
+              </a:fillRef>
+              <a:effectRef idx="0">
+                <a:schemeClr val="accent1"/>
+              </a:effectRef>
+              <a:fontRef idx="minor">
+                <a:schemeClr val="lt1"/>
+              </a:fontRef>
+            </p:style>
+            <p:txBody>
+              <a:bodyPr rtlCol="0" anchor="ctr"/>
+              <a:lstStyle/>
+              <a:p>
+                <a:pPr algn="ctr"/>
+                <a:endParaRPr lang="zh-CN" altLang="en-US"/>
+              </a:p>
+            </p:txBody>
+          </p:sp>
+          <p:sp>
+            <p:nvSpPr>
+              <p:cNvPr id="107" name="Rectangle 106">
+                <a:extLst>
+                  <a:ext uri="{FF2B5EF4-FFF2-40B4-BE49-F238E27FC236}">
+                    <a16:creationId xmlns:a16="http://schemas.microsoft.com/office/drawing/2014/main" id="{54CC6A80-35C6-F187-AFCA-975BBA89A345}"/>
+                  </a:ext>
+                </a:extLst>
+              </p:cNvPr>
+              <p:cNvSpPr/>
+              <p:nvPr/>
+            </p:nvSpPr>
+            <p:spPr>
+              <a:xfrm>
+                <a:off x="4130430" y="2377542"/>
+                <a:ext cx="463810" cy="469289"/>
+              </a:xfrm>
+              <a:prstGeom prst="rect">
+                <a:avLst/>
+              </a:prstGeom>
+              <a:solidFill>
+                <a:srgbClr val="00B0F0"/>
+              </a:solidFill>
+              <a:ln>
+                <a:noFill/>
+              </a:ln>
+            </p:spPr>
+            <p:style>
+              <a:lnRef idx="2">
+                <a:schemeClr val="accent1">
+                  <a:shade val="15000"/>
+                </a:schemeClr>
+              </a:lnRef>
+              <a:fillRef idx="1">
+                <a:schemeClr val="accent1"/>
+              </a:fillRef>
+              <a:effectRef idx="0">
+                <a:schemeClr val="accent1"/>
+              </a:effectRef>
+              <a:fontRef idx="minor">
+                <a:schemeClr val="lt1"/>
+              </a:fontRef>
+            </p:style>
+            <p:txBody>
+              <a:bodyPr rtlCol="0" anchor="ctr"/>
+              <a:lstStyle/>
+              <a:p>
+                <a:pPr algn="ctr"/>
+                <a:endParaRPr lang="zh-CN" altLang="en-US"/>
+              </a:p>
+            </p:txBody>
+          </p:sp>
+          <p:sp>
+            <p:nvSpPr>
+              <p:cNvPr id="108" name="Rectangle 107">
+                <a:extLst>
+                  <a:ext uri="{FF2B5EF4-FFF2-40B4-BE49-F238E27FC236}">
+                    <a16:creationId xmlns:a16="http://schemas.microsoft.com/office/drawing/2014/main" id="{2F886CB0-238D-FE06-6F98-C9F585A095E0}"/>
+                  </a:ext>
+                </a:extLst>
+              </p:cNvPr>
+              <p:cNvSpPr/>
+              <p:nvPr/>
+            </p:nvSpPr>
+            <p:spPr>
+              <a:xfrm>
+                <a:off x="4588675" y="2375684"/>
+                <a:ext cx="463810" cy="469289"/>
+              </a:xfrm>
+              <a:prstGeom prst="rect">
+                <a:avLst/>
+              </a:prstGeom>
+              <a:solidFill>
+                <a:srgbClr val="00B0F0"/>
+              </a:solidFill>
+              <a:ln>
+                <a:noFill/>
+              </a:ln>
+            </p:spPr>
+            <p:style>
+              <a:lnRef idx="2">
+                <a:schemeClr val="accent1">
+                  <a:shade val="15000"/>
+                </a:schemeClr>
+              </a:lnRef>
+              <a:fillRef idx="1">
+                <a:schemeClr val="accent1"/>
+              </a:fillRef>
+              <a:effectRef idx="0">
+                <a:schemeClr val="accent1"/>
+              </a:effectRef>
+              <a:fontRef idx="minor">
+                <a:schemeClr val="lt1"/>
+              </a:fontRef>
+            </p:style>
+            <p:txBody>
+              <a:bodyPr rtlCol="0" anchor="ctr"/>
+              <a:lstStyle/>
+              <a:p>
+                <a:pPr algn="ctr"/>
+                <a:endParaRPr lang="zh-CN" altLang="en-US"/>
+              </a:p>
+            </p:txBody>
+          </p:sp>
+          <p:sp>
+            <p:nvSpPr>
+              <p:cNvPr id="109" name="Rectangle 108">
+                <a:extLst>
+                  <a:ext uri="{FF2B5EF4-FFF2-40B4-BE49-F238E27FC236}">
+                    <a16:creationId xmlns:a16="http://schemas.microsoft.com/office/drawing/2014/main" id="{847BAA00-C528-E2DF-263F-E6E5159D7948}"/>
+                  </a:ext>
+                </a:extLst>
+              </p:cNvPr>
+              <p:cNvSpPr/>
+              <p:nvPr/>
+            </p:nvSpPr>
+            <p:spPr>
+              <a:xfrm>
+                <a:off x="5046999" y="1911299"/>
+                <a:ext cx="463810" cy="469289"/>
+              </a:xfrm>
+              <a:prstGeom prst="rect">
+                <a:avLst/>
+              </a:prstGeom>
+              <a:solidFill>
+                <a:srgbClr val="00B0F0"/>
+              </a:solidFill>
+              <a:ln>
+                <a:noFill/>
+              </a:ln>
+            </p:spPr>
+            <p:style>
+              <a:lnRef idx="2">
+                <a:schemeClr val="accent1">
+                  <a:shade val="15000"/>
+                </a:schemeClr>
+              </a:lnRef>
+              <a:fillRef idx="1">
+                <a:schemeClr val="accent1"/>
+              </a:fillRef>
+              <a:effectRef idx="0">
+                <a:schemeClr val="accent1"/>
+              </a:effectRef>
+              <a:fontRef idx="minor">
+                <a:schemeClr val="lt1"/>
+              </a:fontRef>
+            </p:style>
+            <p:txBody>
+              <a:bodyPr rtlCol="0" anchor="ctr"/>
+              <a:lstStyle/>
+              <a:p>
+                <a:pPr algn="ctr"/>
+                <a:endParaRPr lang="zh-CN" altLang="en-US"/>
+              </a:p>
+            </p:txBody>
+          </p:sp>
+          <p:sp>
+            <p:nvSpPr>
+              <p:cNvPr id="110" name="Rectangle 109">
+                <a:extLst>
+                  <a:ext uri="{FF2B5EF4-FFF2-40B4-BE49-F238E27FC236}">
+                    <a16:creationId xmlns:a16="http://schemas.microsoft.com/office/drawing/2014/main" id="{8BE47F94-E408-48C2-B20D-AF3023519586}"/>
+                  </a:ext>
+                </a:extLst>
+              </p:cNvPr>
+              <p:cNvSpPr/>
+              <p:nvPr/>
+            </p:nvSpPr>
+            <p:spPr>
+              <a:xfrm>
+                <a:off x="5485157" y="1451039"/>
+                <a:ext cx="463810" cy="469289"/>
+              </a:xfrm>
+              <a:prstGeom prst="rect">
+                <a:avLst/>
+              </a:prstGeom>
+              <a:solidFill>
+                <a:srgbClr val="00B0F0"/>
+              </a:solidFill>
+              <a:ln>
+                <a:noFill/>
+              </a:ln>
+            </p:spPr>
+            <p:style>
+              <a:lnRef idx="2">
+                <a:schemeClr val="accent1">
+                  <a:shade val="15000"/>
+                </a:schemeClr>
+              </a:lnRef>
+              <a:fillRef idx="1">
+                <a:schemeClr val="accent1"/>
+              </a:fillRef>
+              <a:effectRef idx="0">
+                <a:schemeClr val="accent1"/>
+              </a:effectRef>
+              <a:fontRef idx="minor">
+                <a:schemeClr val="lt1"/>
+              </a:fontRef>
+            </p:style>
+            <p:txBody>
+              <a:bodyPr rtlCol="0" anchor="ctr"/>
+              <a:lstStyle/>
+              <a:p>
+                <a:pPr algn="ctr"/>
+                <a:endParaRPr lang="zh-CN" altLang="en-US"/>
+              </a:p>
+            </p:txBody>
+          </p:sp>
+          <p:sp>
+            <p:nvSpPr>
+              <p:cNvPr id="111" name="Rectangle 110">
+                <a:extLst>
+                  <a:ext uri="{FF2B5EF4-FFF2-40B4-BE49-F238E27FC236}">
+                    <a16:creationId xmlns:a16="http://schemas.microsoft.com/office/drawing/2014/main" id="{6312BD1B-5AE8-EFA5-2EFE-C67849CC79DF}"/>
+                  </a:ext>
+                </a:extLst>
+              </p:cNvPr>
+              <p:cNvSpPr/>
+              <p:nvPr/>
+            </p:nvSpPr>
+            <p:spPr>
+              <a:xfrm>
+                <a:off x="5927420" y="987912"/>
+                <a:ext cx="463810" cy="469289"/>
+              </a:xfrm>
+              <a:prstGeom prst="rect">
+                <a:avLst/>
+              </a:prstGeom>
+              <a:solidFill>
+                <a:srgbClr val="00B0F0"/>
+              </a:solidFill>
+              <a:ln>
+                <a:noFill/>
+              </a:ln>
+            </p:spPr>
+            <p:style>
+              <a:lnRef idx="2">
+                <a:schemeClr val="accent1">
+                  <a:shade val="15000"/>
+                </a:schemeClr>
+              </a:lnRef>
+              <a:fillRef idx="1">
+                <a:schemeClr val="accent1"/>
+              </a:fillRef>
+              <a:effectRef idx="0">
+                <a:schemeClr val="accent1"/>
+              </a:effectRef>
+              <a:fontRef idx="minor">
+                <a:schemeClr val="lt1"/>
+              </a:fontRef>
+            </p:style>
+            <p:txBody>
+              <a:bodyPr rtlCol="0" anchor="ctr"/>
+              <a:lstStyle/>
+              <a:p>
+                <a:pPr algn="ctr"/>
+                <a:endParaRPr lang="zh-CN" altLang="en-US"/>
+              </a:p>
+            </p:txBody>
+          </p:sp>
+          <p:sp>
+            <p:nvSpPr>
+              <p:cNvPr id="112" name="Rectangle 111">
+                <a:extLst>
+                  <a:ext uri="{FF2B5EF4-FFF2-40B4-BE49-F238E27FC236}">
+                    <a16:creationId xmlns:a16="http://schemas.microsoft.com/office/drawing/2014/main" id="{4032451A-FF1F-EDDF-A3A0-28EC4D2EC48F}"/>
+                  </a:ext>
+                </a:extLst>
+              </p:cNvPr>
+              <p:cNvSpPr/>
+              <p:nvPr/>
+            </p:nvSpPr>
+            <p:spPr>
+              <a:xfrm>
+                <a:off x="6379148" y="986519"/>
+                <a:ext cx="463810" cy="469289"/>
+              </a:xfrm>
+              <a:prstGeom prst="rect">
+                <a:avLst/>
+              </a:prstGeom>
+              <a:solidFill>
+                <a:srgbClr val="00B0F0"/>
+              </a:solidFill>
+              <a:ln>
+                <a:noFill/>
+              </a:ln>
+            </p:spPr>
+            <p:style>
+              <a:lnRef idx="2">
+                <a:schemeClr val="accent1">
+                  <a:shade val="15000"/>
+                </a:schemeClr>
+              </a:lnRef>
+              <a:fillRef idx="1">
+                <a:schemeClr val="accent1"/>
+              </a:fillRef>
+              <a:effectRef idx="0">
+                <a:schemeClr val="accent1"/>
+              </a:effectRef>
+              <a:fontRef idx="minor">
+                <a:schemeClr val="lt1"/>
+              </a:fontRef>
+            </p:style>
+            <p:txBody>
+              <a:bodyPr rtlCol="0" anchor="ctr"/>
+              <a:lstStyle/>
+              <a:p>
+                <a:pPr algn="ctr"/>
+                <a:endParaRPr lang="zh-CN" altLang="en-US"/>
+              </a:p>
+            </p:txBody>
+          </p:sp>
+          <p:sp>
+            <p:nvSpPr>
+              <p:cNvPr id="113" name="Rectangle 112">
+                <a:extLst>
+                  <a:ext uri="{FF2B5EF4-FFF2-40B4-BE49-F238E27FC236}">
+                    <a16:creationId xmlns:a16="http://schemas.microsoft.com/office/drawing/2014/main" id="{8BE1616B-8B85-38F1-4D0E-9B12DEA981CE}"/>
+                  </a:ext>
+                </a:extLst>
+              </p:cNvPr>
+              <p:cNvSpPr/>
+              <p:nvPr/>
+            </p:nvSpPr>
+            <p:spPr>
+              <a:xfrm>
+                <a:off x="6836972" y="985126"/>
+                <a:ext cx="463810" cy="469289"/>
+              </a:xfrm>
+              <a:prstGeom prst="rect">
+                <a:avLst/>
+              </a:prstGeom>
+              <a:solidFill>
+                <a:srgbClr val="00B0F0"/>
+              </a:solidFill>
+              <a:ln>
+                <a:noFill/>
+              </a:ln>
+            </p:spPr>
+            <p:style>
+              <a:lnRef idx="2">
+                <a:schemeClr val="accent1">
+                  <a:shade val="15000"/>
+                </a:schemeClr>
+              </a:lnRef>
+              <a:fillRef idx="1">
+                <a:schemeClr val="accent1"/>
+              </a:fillRef>
+              <a:effectRef idx="0">
+                <a:schemeClr val="accent1"/>
+              </a:effectRef>
+              <a:fontRef idx="minor">
+                <a:schemeClr val="lt1"/>
+              </a:fontRef>
+            </p:style>
+            <p:txBody>
+              <a:bodyPr rtlCol="0" anchor="ctr"/>
+              <a:lstStyle/>
+              <a:p>
+                <a:pPr algn="ctr"/>
+                <a:endParaRPr lang="zh-CN" altLang="en-US"/>
+              </a:p>
+            </p:txBody>
+          </p:sp>
+        </p:grpSp>
+        <p:sp>
+          <p:nvSpPr>
+            <p:cNvPr id="115" name="Arrow: Up 114">
+              <a:extLst>
+                <a:ext uri="{FF2B5EF4-FFF2-40B4-BE49-F238E27FC236}">
+                  <a16:creationId xmlns:a16="http://schemas.microsoft.com/office/drawing/2014/main" id="{E4C899E9-61C2-5B19-81CF-A1E846E8D974}"/>
+                </a:ext>
+              </a:extLst>
+            </p:cNvPr>
+            <p:cNvSpPr/>
+            <p:nvPr/>
+          </p:nvSpPr>
+          <p:spPr>
+            <a:xfrm rot="3263251">
+              <a:off x="5603210" y="1806434"/>
+              <a:ext cx="268216" cy="1212888"/>
+            </a:xfrm>
+            <a:prstGeom prst="upArrow">
+              <a:avLst>
+                <a:gd name="adj1" fmla="val 50000"/>
+                <a:gd name="adj2" fmla="val 93183"/>
+              </a:avLst>
+            </a:prstGeom>
+            <a:solidFill>
+              <a:schemeClr val="accent4">
+                <a:lumMod val="60000"/>
+                <a:lumOff val="40000"/>
+              </a:schemeClr>
+            </a:solidFill>
+            <a:ln>
+              <a:noFill/>
+            </a:ln>
+          </p:spPr>
+          <p:style>
+            <a:lnRef idx="2">
+              <a:schemeClr val="accent1">
+                <a:shade val="15000"/>
+              </a:schemeClr>
+            </a:lnRef>
+            <a:fillRef idx="1">
+              <a:schemeClr val="accent1"/>
+            </a:fillRef>
+            <a:effectRef idx="0">
+              <a:schemeClr val="accent1"/>
+            </a:effectRef>
+            <a:fontRef idx="minor">
+              <a:schemeClr val="lt1"/>
+            </a:fontRef>
+          </p:style>
+          <p:txBody>
+            <a:bodyPr rtlCol="0" anchor="ctr"/>
+            <a:lstStyle/>
+            <a:p>
+              <a:pPr algn="ctr"/>
+              <a:endParaRPr lang="zh-CN" altLang="en-US"/>
+            </a:p>
+          </p:txBody>
+        </p:sp>
+        <p:sp>
+          <p:nvSpPr>
+            <p:cNvPr id="116" name="TextBox 115">
+              <a:extLst>
+                <a:ext uri="{FF2B5EF4-FFF2-40B4-BE49-F238E27FC236}">
+                  <a16:creationId xmlns:a16="http://schemas.microsoft.com/office/drawing/2014/main" id="{05E2D2F9-5BFB-9190-4910-EF1A67A29D8E}"/>
+                </a:ext>
+              </a:extLst>
+            </p:cNvPr>
+            <p:cNvSpPr txBox="1"/>
+            <p:nvPr/>
+          </p:nvSpPr>
+          <p:spPr>
+            <a:xfrm>
+              <a:off x="5291785" y="2440927"/>
+              <a:ext cx="2204450" cy="253916"/>
+            </a:xfrm>
+            <a:prstGeom prst="rect">
+              <a:avLst/>
+            </a:prstGeom>
+            <a:noFill/>
+          </p:spPr>
+          <p:txBody>
+            <a:bodyPr wrap="none" rtlCol="0">
+              <a:spAutoFit/>
+            </a:bodyPr>
+            <a:lstStyle/>
+            <a:p>
+              <a:r>
+                <a:rPr lang="zh-CN" altLang="en-US" sz="1050" b="1" dirty="0">
+                  <a:solidFill>
+                    <a:srgbClr val="FF0000"/>
+                  </a:solidFill>
+                  <a:latin typeface="楷体" panose="02010609060101010101" pitchFamily="49" charset="-122"/>
+                  <a:ea typeface="楷体" panose="02010609060101010101" pitchFamily="49" charset="-122"/>
+                </a:rPr>
+                <a:t>只有单调向上的路径才是合法路径</a:t>
+              </a:r>
+            </a:p>
+          </p:txBody>
+        </p:sp>
+      </p:grpSp>
+    </p:spTree>
+    <p:extLst>
+      <p:ext uri="{BB962C8B-B14F-4D97-AF65-F5344CB8AC3E}">
+        <p14:creationId xmlns:p14="http://schemas.microsoft.com/office/powerpoint/2010/main" val="2647609215"/>
+      </p:ext>
+    </p:extLst>
+  </p:cSld>
+  <p:clrMapOvr>
+    <a:masterClrMapping/>
+  </p:clrMapOvr>
+</p:sld>
+</file>
+
 <file path=ppt/theme/theme1.xml><?xml version="1.0" encoding="utf-8"?>
 <a:theme xmlns:a="http://schemas.openxmlformats.org/drawingml/2006/main" name="Office Theme">
   <a:themeElements>

</xml_diff>